<commit_message>
Update 0403 project05 - 파워포인트 - 형준.pptx
</commit_message>
<xml_diff>
--- a/0 발표용 파워포인트/0403 1차발표/0403 project05 - 파워포인트 - 형준.pptx
+++ b/0 발표용 파워포인트/0403 1차발표/0403 project05 - 파워포인트 - 형준.pptx
@@ -9,14 +9,14 @@
   </p:notesMasterIdLst>
   <p:sldIdLst>
     <p:sldId id="256" r:id="rId2"/>
-    <p:sldId id="257" r:id="rId3"/>
-    <p:sldId id="264" r:id="rId4"/>
-    <p:sldId id="260" r:id="rId5"/>
-    <p:sldId id="261" r:id="rId6"/>
-    <p:sldId id="262" r:id="rId7"/>
-    <p:sldId id="263" r:id="rId8"/>
-    <p:sldId id="258" r:id="rId9"/>
-    <p:sldId id="259" r:id="rId10"/>
+    <p:sldId id="266" r:id="rId3"/>
+    <p:sldId id="267" r:id="rId4"/>
+    <p:sldId id="268" r:id="rId5"/>
+    <p:sldId id="269" r:id="rId6"/>
+    <p:sldId id="270" r:id="rId7"/>
+    <p:sldId id="271" r:id="rId8"/>
+    <p:sldId id="272" r:id="rId9"/>
+    <p:sldId id="273" r:id="rId10"/>
   </p:sldIdLst>
   <p:sldSz cx="12192000" cy="6858000"/>
   <p:notesSz cx="6858000" cy="9144000"/>
@@ -117,7 +117,7 @@
   </p:defaultTextStyle>
   <p:extLst>
     <p:ext uri="{EFAFB233-063F-42B5-8137-9DF3F51BA10A}">
-      <p15:sldGuideLst xmlns="" xmlns:p15="http://schemas.microsoft.com/office/powerpoint/2012/main">
+      <p15:sldGuideLst xmlns:p15="http://schemas.microsoft.com/office/powerpoint/2012/main" xmlns="">
         <p15:guide id="1" orient="horz" pos="2160">
           <p15:clr>
             <a:srgbClr val="A4A3A4"/>
@@ -4062,6 +4062,60 @@
           </a:p>
         </p:txBody>
       </p:sp>
+      <p:pic>
+        <p:nvPicPr>
+          <p:cNvPr id="1026" name="Picture 2"/>
+          <p:cNvPicPr>
+            <a:picLocks noChangeAspect="1" noChangeArrowheads="1"/>
+          </p:cNvPicPr>
+          <p:nvPr userDrawn="1"/>
+        </p:nvPicPr>
+        <p:blipFill>
+          <a:blip r:embed="rId13">
+            <a:extLst>
+              <a:ext uri="{28A0092B-C50C-407E-A947-70E740481C1C}">
+                <a14:useLocalDpi xmlns:a14="http://schemas.microsoft.com/office/drawing/2010/main" val="0"/>
+              </a:ext>
+            </a:extLst>
+          </a:blip>
+          <a:srcRect/>
+          <a:stretch>
+            <a:fillRect/>
+          </a:stretch>
+        </p:blipFill>
+        <p:spPr bwMode="auto">
+          <a:xfrm>
+            <a:off x="0" y="0"/>
+            <a:ext cx="12200467" cy="6858000"/>
+          </a:xfrm>
+          <a:prstGeom prst="rect">
+            <a:avLst/>
+          </a:prstGeom>
+          <a:noFill/>
+          <a:ln>
+            <a:noFill/>
+          </a:ln>
+          <a:extLst>
+            <a:ext uri="{909E8E84-426E-40DD-AFC4-6F175D3DCCD1}">
+              <a14:hiddenFill xmlns:a14="http://schemas.microsoft.com/office/drawing/2010/main">
+                <a:solidFill>
+                  <a:schemeClr val="accent1"/>
+                </a:solidFill>
+              </a14:hiddenFill>
+            </a:ext>
+            <a:ext uri="{91240B29-F687-4F45-9708-019B960494DF}">
+              <a14:hiddenLine xmlns:a14="http://schemas.microsoft.com/office/drawing/2010/main" w="9525">
+                <a:solidFill>
+                  <a:schemeClr val="tx1"/>
+                </a:solidFill>
+                <a:miter lim="800000"/>
+                <a:headEnd/>
+                <a:tailEnd/>
+              </a14:hiddenLine>
+            </a:ext>
+          </a:extLst>
+        </p:spPr>
+      </p:pic>
     </p:spTree>
     <p:extLst>
       <p:ext uri="{BB962C8B-B14F-4D97-AF65-F5344CB8AC3E}">
@@ -4492,13 +4546,13 @@
           <p:nvPr>
             <p:extLst>
               <p:ext uri="{D42A27DB-BD31-4B8C-83A1-F6EECF244321}">
-                <p14:modId xmlns:p14="http://schemas.microsoft.com/office/powerpoint/2010/main" val="3772462927"/>
+                <p14:modId xmlns:p14="http://schemas.microsoft.com/office/powerpoint/2010/main" val="1346932349"/>
               </p:ext>
             </p:extLst>
           </p:nvPr>
         </p:nvGraphicFramePr>
         <p:xfrm>
-          <a:off x="8801048" y="1873942"/>
+          <a:off x="8851848" y="2792794"/>
           <a:ext cx="2952330" cy="2906958"/>
         </p:xfrm>
         <a:graphic>
@@ -4511,14 +4565,14 @@
                 <a:gridCol w="289755">
                   <a:extLst>
                     <a:ext uri="{9D8B030D-6E8A-4147-A177-3AD203B41FA5}">
-                      <a16:colId xmlns="" xmlns:a16="http://schemas.microsoft.com/office/drawing/2014/main" val="20000"/>
+                      <a16:colId xmlns:a16="http://schemas.microsoft.com/office/drawing/2014/main" xmlns="" val="20000"/>
                     </a:ext>
                   </a:extLst>
                 </a:gridCol>
                 <a:gridCol w="2662575">
                   <a:extLst>
                     <a:ext uri="{9D8B030D-6E8A-4147-A177-3AD203B41FA5}">
-                      <a16:colId xmlns="" xmlns:a16="http://schemas.microsoft.com/office/drawing/2014/main" val="20001"/>
+                      <a16:colId xmlns:a16="http://schemas.microsoft.com/office/drawing/2014/main" xmlns="" val="20001"/>
                     </a:ext>
                   </a:extLst>
                 </a:gridCol>
@@ -4676,7 +4730,7 @@
                 </a:tc>
                 <a:extLst>
                   <a:ext uri="{0D108BD9-81ED-4DB2-BD59-A6C34878D82A}">
-                    <a16:rowId xmlns="" xmlns:a16="http://schemas.microsoft.com/office/drawing/2014/main" val="10000"/>
+                    <a16:rowId xmlns:a16="http://schemas.microsoft.com/office/drawing/2014/main" xmlns="" val="10000"/>
                   </a:ext>
                 </a:extLst>
               </a:tr>
@@ -4837,7 +4891,7 @@
                 </a:tc>
                 <a:extLst>
                   <a:ext uri="{0D108BD9-81ED-4DB2-BD59-A6C34878D82A}">
-                    <a16:rowId xmlns="" xmlns:a16="http://schemas.microsoft.com/office/drawing/2014/main" val="10001"/>
+                    <a16:rowId xmlns:a16="http://schemas.microsoft.com/office/drawing/2014/main" xmlns="" val="10001"/>
                   </a:ext>
                 </a:extLst>
               </a:tr>
@@ -5049,7 +5103,7 @@
                 </a:tc>
                 <a:extLst>
                   <a:ext uri="{0D108BD9-81ED-4DB2-BD59-A6C34878D82A}">
-                    <a16:rowId xmlns="" xmlns:a16="http://schemas.microsoft.com/office/drawing/2014/main" val="10002"/>
+                    <a16:rowId xmlns:a16="http://schemas.microsoft.com/office/drawing/2014/main" xmlns="" val="10002"/>
                   </a:ext>
                 </a:extLst>
               </a:tr>
@@ -5218,7 +5272,7 @@
                 </a:tc>
                 <a:extLst>
                   <a:ext uri="{0D108BD9-81ED-4DB2-BD59-A6C34878D82A}">
-                    <a16:rowId xmlns="" xmlns:a16="http://schemas.microsoft.com/office/drawing/2014/main" val="10003"/>
+                    <a16:rowId xmlns:a16="http://schemas.microsoft.com/office/drawing/2014/main" xmlns="" val="10003"/>
                   </a:ext>
                 </a:extLst>
               </a:tr>
@@ -7482,231 +7536,6 @@
       </p:sp>
       <p:graphicFrame>
         <p:nvGraphicFramePr>
-          <p:cNvPr id="56" name="Google Shape;165;g7c553259d1_0_81"/>
-          <p:cNvGraphicFramePr/>
-          <p:nvPr>
-            <p:extLst>
-              <p:ext uri="{D42A27DB-BD31-4B8C-83A1-F6EECF244321}">
-                <p14:modId xmlns:p14="http://schemas.microsoft.com/office/powerpoint/2010/main" val="1005765636"/>
-              </p:ext>
-            </p:extLst>
-          </p:nvPr>
-        </p:nvGraphicFramePr>
-        <p:xfrm>
-          <a:off x="1898479" y="205423"/>
-          <a:ext cx="6048672" cy="864096"/>
-        </p:xfrm>
-        <a:graphic>
-          <a:graphicData uri="http://schemas.openxmlformats.org/drawingml/2006/table">
-            <a:tbl>
-              <a:tblPr firstRow="1" bandRow="1">
-                <a:noFill/>
-              </a:tblPr>
-              <a:tblGrid>
-                <a:gridCol w="1152128">
-                  <a:extLst>
-                    <a:ext uri="{9D8B030D-6E8A-4147-A177-3AD203B41FA5}">
-                      <a16:colId xmlns:a16="http://schemas.microsoft.com/office/drawing/2014/main" xmlns="" val="20000"/>
-                    </a:ext>
-                  </a:extLst>
-                </a:gridCol>
-                <a:gridCol w="4896544">
-                  <a:extLst>
-                    <a:ext uri="{9D8B030D-6E8A-4147-A177-3AD203B41FA5}">
-                      <a16:colId xmlns:a16="http://schemas.microsoft.com/office/drawing/2014/main" xmlns="" val="20001"/>
-                    </a:ext>
-                  </a:extLst>
-                </a:gridCol>
-              </a:tblGrid>
-              <a:tr h="864096">
-                <a:tc>
-                  <a:txBody>
-                    <a:bodyPr/>
-                    <a:lstStyle/>
-                    <a:p>
-                      <a:pPr marL="0" marR="0" lvl="0" indent="0" algn="ctr" rtl="0">
-                        <a:lnSpc>
-                          <a:spcPct val="100000"/>
-                        </a:lnSpc>
-                        <a:spcBef>
-                          <a:spcPts val="0"/>
-                        </a:spcBef>
-                        <a:spcAft>
-                          <a:spcPts val="0"/>
-                        </a:spcAft>
-                        <a:buClr>
-                          <a:srgbClr val="000000"/>
-                        </a:buClr>
-                        <a:buSzPts val="1500"/>
-                        <a:buFont typeface="Arial"/>
-                        <a:buNone/>
-                      </a:pPr>
-                      <a:r>
-                        <a:rPr lang="ko-KR" altLang="en-US" sz="1500" b="0" u="none" strike="noStrike" cap="none" dirty="0" err="1" smtClean="0">
-                          <a:solidFill>
-                            <a:schemeClr val="dk1"/>
-                          </a:solidFill>
-                        </a:rPr>
-                        <a:t>화면명</a:t>
-                      </a:r>
-                      <a:endParaRPr sz="1500" b="0" u="none" strike="noStrike" cap="none" dirty="0">
-                        <a:solidFill>
-                          <a:schemeClr val="dk1"/>
-                        </a:solidFill>
-                      </a:endParaRPr>
-                    </a:p>
-                  </a:txBody>
-                  <a:tcPr marL="74304" marR="74304" marT="45725" marB="45725" anchor="ctr">
-                    <a:lnL w="12700" cap="flat" cmpd="sng">
-                      <a:solidFill>
-                        <a:schemeClr val="dk1"/>
-                      </a:solidFill>
-                      <a:prstDash val="solid"/>
-                      <a:round/>
-                      <a:headEnd type="none" w="sm" len="sm"/>
-                      <a:tailEnd type="none" w="sm" len="sm"/>
-                    </a:lnL>
-                    <a:lnR w="12700" cap="flat" cmpd="sng">
-                      <a:solidFill>
-                        <a:schemeClr val="dk1"/>
-                      </a:solidFill>
-                      <a:prstDash val="solid"/>
-                      <a:round/>
-                      <a:headEnd type="none" w="sm" len="sm"/>
-                      <a:tailEnd type="none" w="sm" len="sm"/>
-                    </a:lnR>
-                    <a:lnT w="12700" cap="flat" cmpd="sng">
-                      <a:solidFill>
-                        <a:schemeClr val="dk1"/>
-                      </a:solidFill>
-                      <a:prstDash val="solid"/>
-                      <a:round/>
-                      <a:headEnd type="none" w="sm" len="sm"/>
-                      <a:tailEnd type="none" w="sm" len="sm"/>
-                    </a:lnT>
-                    <a:lnB w="12700" cap="flat" cmpd="sng">
-                      <a:solidFill>
-                        <a:schemeClr val="dk1"/>
-                      </a:solidFill>
-                      <a:prstDash val="solid"/>
-                      <a:round/>
-                      <a:headEnd type="none" w="sm" len="sm"/>
-                      <a:tailEnd type="none" w="sm" len="sm"/>
-                    </a:lnB>
-                    <a:solidFill>
-                      <a:srgbClr val="D8D8D8"/>
-                    </a:solidFill>
-                  </a:tcPr>
-                </a:tc>
-                <a:tc>
-                  <a:txBody>
-                    <a:bodyPr/>
-                    <a:lstStyle/>
-                    <a:p>
-                      <a:pPr marL="0" marR="0" lvl="0" indent="0" algn="ctr" defTabSz="914400" rtl="0" eaLnBrk="1" fontAlgn="auto" latinLnBrk="1" hangingPunct="1">
-                        <a:lnSpc>
-                          <a:spcPct val="100000"/>
-                        </a:lnSpc>
-                        <a:spcBef>
-                          <a:spcPts val="0"/>
-                        </a:spcBef>
-                        <a:spcAft>
-                          <a:spcPts val="0"/>
-                        </a:spcAft>
-                        <a:buClr>
-                          <a:srgbClr val="000000"/>
-                        </a:buClr>
-                        <a:buSzPts val="1500"/>
-                        <a:buFont typeface="Arial"/>
-                        <a:buNone/>
-                        <a:tabLst/>
-                        <a:defRPr/>
-                      </a:pPr>
-                      <a:r>
-                        <a:rPr lang="ko-KR" altLang="en-US" sz="2800" b="0" u="none" strike="noStrike" cap="none" baseline="0" dirty="0" smtClean="0">
-                          <a:solidFill>
-                            <a:schemeClr val="dk1"/>
-                          </a:solidFill>
-                        </a:rPr>
-                        <a:t>세미나 등록</a:t>
-                      </a:r>
-                      <a:r>
-                        <a:rPr lang="en-US" altLang="ko-KR" sz="1500" b="0" u="none" strike="noStrike" cap="none" baseline="0" dirty="0" smtClean="0">
-                          <a:solidFill>
-                            <a:schemeClr val="dk1"/>
-                          </a:solidFill>
-                        </a:rPr>
-                        <a:t>– </a:t>
-                      </a:r>
-                      <a:r>
-                        <a:rPr lang="ko-KR" altLang="en-US" sz="1500" b="0" u="none" strike="noStrike" cap="none" baseline="0" dirty="0" smtClean="0">
-                          <a:solidFill>
-                            <a:schemeClr val="dk1"/>
-                          </a:solidFill>
-                        </a:rPr>
-                        <a:t>등록 폼</a:t>
-                      </a:r>
-                      <a:endParaRPr lang="ko-KR" altLang="en-US" sz="1500" b="0" u="none" strike="noStrike" cap="none" dirty="0" smtClean="0">
-                        <a:solidFill>
-                          <a:schemeClr val="dk1"/>
-                        </a:solidFill>
-                      </a:endParaRPr>
-                    </a:p>
-                  </a:txBody>
-                  <a:tcPr marL="74304" marR="74304" marT="45725" marB="45725" anchor="ctr">
-                    <a:lnL w="12700" cap="flat" cmpd="sng">
-                      <a:solidFill>
-                        <a:schemeClr val="dk1"/>
-                      </a:solidFill>
-                      <a:prstDash val="solid"/>
-                      <a:round/>
-                      <a:headEnd type="none" w="sm" len="sm"/>
-                      <a:tailEnd type="none" w="sm" len="sm"/>
-                    </a:lnL>
-                    <a:lnR w="12700" cap="flat" cmpd="sng">
-                      <a:solidFill>
-                        <a:schemeClr val="dk1"/>
-                      </a:solidFill>
-                      <a:prstDash val="solid"/>
-                      <a:round/>
-                      <a:headEnd type="none" w="sm" len="sm"/>
-                      <a:tailEnd type="none" w="sm" len="sm"/>
-                    </a:lnR>
-                    <a:lnT w="12700" cap="flat" cmpd="sng">
-                      <a:solidFill>
-                        <a:schemeClr val="dk1"/>
-                      </a:solidFill>
-                      <a:prstDash val="solid"/>
-                      <a:round/>
-                      <a:headEnd type="none" w="sm" len="sm"/>
-                      <a:tailEnd type="none" w="sm" len="sm"/>
-                    </a:lnT>
-                    <a:lnB w="12700" cap="flat" cmpd="sng">
-                      <a:solidFill>
-                        <a:schemeClr val="dk1"/>
-                      </a:solidFill>
-                      <a:prstDash val="solid"/>
-                      <a:round/>
-                      <a:headEnd type="none" w="sm" len="sm"/>
-                      <a:tailEnd type="none" w="sm" len="sm"/>
-                    </a:lnB>
-                    <a:solidFill>
-                      <a:schemeClr val="lt1"/>
-                    </a:solidFill>
-                  </a:tcPr>
-                </a:tc>
-                <a:extLst>
-                  <a:ext uri="{0D108BD9-81ED-4DB2-BD59-A6C34878D82A}">
-                    <a16:rowId xmlns:a16="http://schemas.microsoft.com/office/drawing/2014/main" xmlns="" val="10000"/>
-                  </a:ext>
-                </a:extLst>
-              </a:tr>
-            </a:tbl>
-          </a:graphicData>
-        </a:graphic>
-      </p:graphicFrame>
-      <p:graphicFrame>
-        <p:nvGraphicFramePr>
           <p:cNvPr id="57" name="표 56"/>
           <p:cNvGraphicFramePr>
             <a:graphicFrameLocks noGrp="1"/>
@@ -7714,13 +7543,13 @@
           <p:nvPr>
             <p:extLst>
               <p:ext uri="{D42A27DB-BD31-4B8C-83A1-F6EECF244321}">
-                <p14:modId xmlns:p14="http://schemas.microsoft.com/office/powerpoint/2010/main" val="1156851867"/>
+                <p14:modId xmlns:p14="http://schemas.microsoft.com/office/powerpoint/2010/main" val="2317172651"/>
               </p:ext>
             </p:extLst>
           </p:nvPr>
         </p:nvGraphicFramePr>
         <p:xfrm>
-          <a:off x="9130359" y="736572"/>
+          <a:off x="9181159" y="1655424"/>
           <a:ext cx="2272876" cy="655340"/>
         </p:xfrm>
         <a:graphic>
@@ -7898,16 +7727,92 @@
           </a:graphicData>
         </a:graphic>
       </p:graphicFrame>
+      <p:sp>
+        <p:nvSpPr>
+          <p:cNvPr id="58" name="TextBox 57"/>
+          <p:cNvSpPr txBox="1"/>
+          <p:nvPr/>
+        </p:nvSpPr>
+        <p:spPr>
+          <a:xfrm>
+            <a:off x="380466" y="160866"/>
+            <a:ext cx="6455083" cy="584775"/>
+          </a:xfrm>
+          <a:prstGeom prst="rect">
+            <a:avLst/>
+          </a:prstGeom>
+          <a:noFill/>
+        </p:spPr>
+        <p:txBody>
+          <a:bodyPr wrap="square" rtlCol="0">
+            <a:spAutoFit/>
+          </a:bodyPr>
+          <a:lstStyle/>
+          <a:p>
+            <a:pPr lvl="0">
+              <a:buClr>
+                <a:srgbClr val="000000"/>
+              </a:buClr>
+              <a:buSzPts val="1500"/>
+              <a:defRPr/>
+            </a:pPr>
+            <a:r>
+              <a:rPr lang="ko-KR" altLang="en-US" sz="3200" dirty="0" smtClean="0">
+                <a:solidFill>
+                  <a:schemeClr val="bg1"/>
+                </a:solidFill>
+              </a:rPr>
+              <a:t>세미나등록</a:t>
+            </a:r>
+            <a:r>
+              <a:rPr lang="ko-KR" altLang="en-US" dirty="0" smtClean="0">
+                <a:solidFill>
+                  <a:schemeClr val="bg1"/>
+                </a:solidFill>
+              </a:rPr>
+              <a:t> </a:t>
+            </a:r>
+            <a:r>
+              <a:rPr lang="en-US" altLang="ko-KR" dirty="0" smtClean="0">
+                <a:solidFill>
+                  <a:schemeClr val="bg1"/>
+                </a:solidFill>
+              </a:rPr>
+              <a:t>– </a:t>
+            </a:r>
+            <a:r>
+              <a:rPr lang="ko-KR" altLang="en-US" dirty="0" smtClean="0">
+                <a:solidFill>
+                  <a:schemeClr val="bg1"/>
+                </a:solidFill>
+              </a:rPr>
+              <a:t>등록 폼</a:t>
+            </a:r>
+            <a:endParaRPr lang="ko-KR" altLang="en-US" dirty="0">
+              <a:solidFill>
+                <a:schemeClr val="bg1"/>
+              </a:solidFill>
+            </a:endParaRPr>
+          </a:p>
+        </p:txBody>
+      </p:sp>
     </p:spTree>
     <p:extLst>
       <p:ext uri="{BB962C8B-B14F-4D97-AF65-F5344CB8AC3E}">
-        <p14:creationId xmlns:p14="http://schemas.microsoft.com/office/powerpoint/2010/main" val="1632429841"/>
+        <p14:creationId xmlns:p14="http://schemas.microsoft.com/office/powerpoint/2010/main" val="1331584913"/>
       </p:ext>
     </p:extLst>
   </p:cSld>
   <p:clrMapOvr>
     <a:masterClrMapping/>
   </p:clrMapOvr>
+  <p:timing>
+    <p:tnLst>
+      <p:par>
+        <p:cTn id="1" dur="indefinite" restart="never" nodeType="tmRoot"/>
+      </p:par>
+    </p:tnLst>
+  </p:timing>
 </p:sld>
 </file>
 
@@ -7935,13 +7840,13 @@
           <p:nvPr>
             <p:extLst>
               <p:ext uri="{D42A27DB-BD31-4B8C-83A1-F6EECF244321}">
-                <p14:modId xmlns:p14="http://schemas.microsoft.com/office/powerpoint/2010/main" val="1812127876"/>
+                <p14:modId xmlns:p14="http://schemas.microsoft.com/office/powerpoint/2010/main" val="531947694"/>
               </p:ext>
             </p:extLst>
           </p:nvPr>
         </p:nvGraphicFramePr>
         <p:xfrm>
-          <a:off x="8809515" y="2199845"/>
+          <a:off x="8911115" y="3224312"/>
           <a:ext cx="2952330" cy="807740"/>
         </p:xfrm>
         <a:graphic>
@@ -7954,14 +7859,14 @@
                 <a:gridCol w="289755">
                   <a:extLst>
                     <a:ext uri="{9D8B030D-6E8A-4147-A177-3AD203B41FA5}">
-                      <a16:colId xmlns="" xmlns:a16="http://schemas.microsoft.com/office/drawing/2014/main" val="20000"/>
+                      <a16:colId xmlns:a16="http://schemas.microsoft.com/office/drawing/2014/main" xmlns="" val="20000"/>
                     </a:ext>
                   </a:extLst>
                 </a:gridCol>
                 <a:gridCol w="2662575">
                   <a:extLst>
                     <a:ext uri="{9D8B030D-6E8A-4147-A177-3AD203B41FA5}">
-                      <a16:colId xmlns="" xmlns:a16="http://schemas.microsoft.com/office/drawing/2014/main" val="20001"/>
+                      <a16:colId xmlns:a16="http://schemas.microsoft.com/office/drawing/2014/main" xmlns="" val="20001"/>
                     </a:ext>
                   </a:extLst>
                 </a:gridCol>
@@ -8119,7 +8024,7 @@
                 </a:tc>
                 <a:extLst>
                   <a:ext uri="{0D108BD9-81ED-4DB2-BD59-A6C34878D82A}">
-                    <a16:rowId xmlns="" xmlns:a16="http://schemas.microsoft.com/office/drawing/2014/main" val="10000"/>
+                    <a16:rowId xmlns:a16="http://schemas.microsoft.com/office/drawing/2014/main" xmlns="" val="10000"/>
                   </a:ext>
                 </a:extLst>
               </a:tr>
@@ -8285,7 +8190,7 @@
                 </a:tc>
                 <a:extLst>
                   <a:ext uri="{0D108BD9-81ED-4DB2-BD59-A6C34878D82A}">
-                    <a16:rowId xmlns="" xmlns:a16="http://schemas.microsoft.com/office/drawing/2014/main" val="10001"/>
+                    <a16:rowId xmlns:a16="http://schemas.microsoft.com/office/drawing/2014/main" xmlns="" val="10001"/>
                   </a:ext>
                 </a:extLst>
               </a:tr>
@@ -8596,231 +8501,6 @@
       </p:sp>
       <p:graphicFrame>
         <p:nvGraphicFramePr>
-          <p:cNvPr id="12" name="Google Shape;165;g7c553259d1_0_81"/>
-          <p:cNvGraphicFramePr/>
-          <p:nvPr>
-            <p:extLst>
-              <p:ext uri="{D42A27DB-BD31-4B8C-83A1-F6EECF244321}">
-                <p14:modId xmlns:p14="http://schemas.microsoft.com/office/powerpoint/2010/main" val="648801919"/>
-              </p:ext>
-            </p:extLst>
-          </p:nvPr>
-        </p:nvGraphicFramePr>
-        <p:xfrm>
-          <a:off x="1898479" y="205423"/>
-          <a:ext cx="6048672" cy="864096"/>
-        </p:xfrm>
-        <a:graphic>
-          <a:graphicData uri="http://schemas.openxmlformats.org/drawingml/2006/table">
-            <a:tbl>
-              <a:tblPr firstRow="1" bandRow="1">
-                <a:noFill/>
-              </a:tblPr>
-              <a:tblGrid>
-                <a:gridCol w="1152128">
-                  <a:extLst>
-                    <a:ext uri="{9D8B030D-6E8A-4147-A177-3AD203B41FA5}">
-                      <a16:colId xmlns:a16="http://schemas.microsoft.com/office/drawing/2014/main" xmlns="" val="20000"/>
-                    </a:ext>
-                  </a:extLst>
-                </a:gridCol>
-                <a:gridCol w="4896544">
-                  <a:extLst>
-                    <a:ext uri="{9D8B030D-6E8A-4147-A177-3AD203B41FA5}">
-                      <a16:colId xmlns:a16="http://schemas.microsoft.com/office/drawing/2014/main" xmlns="" val="20001"/>
-                    </a:ext>
-                  </a:extLst>
-                </a:gridCol>
-              </a:tblGrid>
-              <a:tr h="864096">
-                <a:tc>
-                  <a:txBody>
-                    <a:bodyPr/>
-                    <a:lstStyle/>
-                    <a:p>
-                      <a:pPr marL="0" marR="0" lvl="0" indent="0" algn="ctr" rtl="0">
-                        <a:lnSpc>
-                          <a:spcPct val="100000"/>
-                        </a:lnSpc>
-                        <a:spcBef>
-                          <a:spcPts val="0"/>
-                        </a:spcBef>
-                        <a:spcAft>
-                          <a:spcPts val="0"/>
-                        </a:spcAft>
-                        <a:buClr>
-                          <a:srgbClr val="000000"/>
-                        </a:buClr>
-                        <a:buSzPts val="1500"/>
-                        <a:buFont typeface="Arial"/>
-                        <a:buNone/>
-                      </a:pPr>
-                      <a:r>
-                        <a:rPr lang="ko-KR" altLang="en-US" sz="1500" b="0" u="none" strike="noStrike" cap="none" dirty="0" err="1" smtClean="0">
-                          <a:solidFill>
-                            <a:schemeClr val="dk1"/>
-                          </a:solidFill>
-                        </a:rPr>
-                        <a:t>화면명</a:t>
-                      </a:r>
-                      <a:endParaRPr sz="1500" b="0" u="none" strike="noStrike" cap="none" dirty="0">
-                        <a:solidFill>
-                          <a:schemeClr val="dk1"/>
-                        </a:solidFill>
-                      </a:endParaRPr>
-                    </a:p>
-                  </a:txBody>
-                  <a:tcPr marL="74304" marR="74304" marT="45725" marB="45725" anchor="ctr">
-                    <a:lnL w="12700" cap="flat" cmpd="sng">
-                      <a:solidFill>
-                        <a:schemeClr val="dk1"/>
-                      </a:solidFill>
-                      <a:prstDash val="solid"/>
-                      <a:round/>
-                      <a:headEnd type="none" w="sm" len="sm"/>
-                      <a:tailEnd type="none" w="sm" len="sm"/>
-                    </a:lnL>
-                    <a:lnR w="12700" cap="flat" cmpd="sng">
-                      <a:solidFill>
-                        <a:schemeClr val="dk1"/>
-                      </a:solidFill>
-                      <a:prstDash val="solid"/>
-                      <a:round/>
-                      <a:headEnd type="none" w="sm" len="sm"/>
-                      <a:tailEnd type="none" w="sm" len="sm"/>
-                    </a:lnR>
-                    <a:lnT w="12700" cap="flat" cmpd="sng">
-                      <a:solidFill>
-                        <a:schemeClr val="dk1"/>
-                      </a:solidFill>
-                      <a:prstDash val="solid"/>
-                      <a:round/>
-                      <a:headEnd type="none" w="sm" len="sm"/>
-                      <a:tailEnd type="none" w="sm" len="sm"/>
-                    </a:lnT>
-                    <a:lnB w="12700" cap="flat" cmpd="sng">
-                      <a:solidFill>
-                        <a:schemeClr val="dk1"/>
-                      </a:solidFill>
-                      <a:prstDash val="solid"/>
-                      <a:round/>
-                      <a:headEnd type="none" w="sm" len="sm"/>
-                      <a:tailEnd type="none" w="sm" len="sm"/>
-                    </a:lnB>
-                    <a:solidFill>
-                      <a:srgbClr val="D8D8D8"/>
-                    </a:solidFill>
-                  </a:tcPr>
-                </a:tc>
-                <a:tc>
-                  <a:txBody>
-                    <a:bodyPr/>
-                    <a:lstStyle/>
-                    <a:p>
-                      <a:pPr marL="0" marR="0" lvl="0" indent="0" algn="ctr" defTabSz="914400" rtl="0" eaLnBrk="1" fontAlgn="auto" latinLnBrk="1" hangingPunct="1">
-                        <a:lnSpc>
-                          <a:spcPct val="100000"/>
-                        </a:lnSpc>
-                        <a:spcBef>
-                          <a:spcPts val="0"/>
-                        </a:spcBef>
-                        <a:spcAft>
-                          <a:spcPts val="0"/>
-                        </a:spcAft>
-                        <a:buClr>
-                          <a:srgbClr val="000000"/>
-                        </a:buClr>
-                        <a:buSzPts val="1500"/>
-                        <a:buFont typeface="Arial"/>
-                        <a:buNone/>
-                        <a:tabLst/>
-                        <a:defRPr/>
-                      </a:pPr>
-                      <a:r>
-                        <a:rPr lang="ko-KR" altLang="en-US" sz="2800" b="0" u="none" strike="noStrike" cap="none" baseline="0" dirty="0" smtClean="0">
-                          <a:solidFill>
-                            <a:schemeClr val="dk1"/>
-                          </a:solidFill>
-                        </a:rPr>
-                        <a:t>세미나 등록</a:t>
-                      </a:r>
-                      <a:r>
-                        <a:rPr lang="en-US" altLang="ko-KR" sz="1500" b="0" u="none" strike="noStrike" cap="none" baseline="0" dirty="0" smtClean="0">
-                          <a:solidFill>
-                            <a:schemeClr val="dk1"/>
-                          </a:solidFill>
-                        </a:rPr>
-                        <a:t>– </a:t>
-                      </a:r>
-                      <a:r>
-                        <a:rPr lang="ko-KR" altLang="en-US" sz="1500" b="0" u="none" strike="noStrike" cap="none" baseline="0" dirty="0" smtClean="0">
-                          <a:solidFill>
-                            <a:schemeClr val="dk1"/>
-                          </a:solidFill>
-                        </a:rPr>
-                        <a:t>완료 페이지</a:t>
-                      </a:r>
-                      <a:endParaRPr lang="ko-KR" altLang="en-US" sz="1500" b="0" u="none" strike="noStrike" cap="none" dirty="0" smtClean="0">
-                        <a:solidFill>
-                          <a:schemeClr val="dk1"/>
-                        </a:solidFill>
-                      </a:endParaRPr>
-                    </a:p>
-                  </a:txBody>
-                  <a:tcPr marL="74304" marR="74304" marT="45725" marB="45725" anchor="ctr">
-                    <a:lnL w="12700" cap="flat" cmpd="sng">
-                      <a:solidFill>
-                        <a:schemeClr val="dk1"/>
-                      </a:solidFill>
-                      <a:prstDash val="solid"/>
-                      <a:round/>
-                      <a:headEnd type="none" w="sm" len="sm"/>
-                      <a:tailEnd type="none" w="sm" len="sm"/>
-                    </a:lnL>
-                    <a:lnR w="12700" cap="flat" cmpd="sng">
-                      <a:solidFill>
-                        <a:schemeClr val="dk1"/>
-                      </a:solidFill>
-                      <a:prstDash val="solid"/>
-                      <a:round/>
-                      <a:headEnd type="none" w="sm" len="sm"/>
-                      <a:tailEnd type="none" w="sm" len="sm"/>
-                    </a:lnR>
-                    <a:lnT w="12700" cap="flat" cmpd="sng">
-                      <a:solidFill>
-                        <a:schemeClr val="dk1"/>
-                      </a:solidFill>
-                      <a:prstDash val="solid"/>
-                      <a:round/>
-                      <a:headEnd type="none" w="sm" len="sm"/>
-                      <a:tailEnd type="none" w="sm" len="sm"/>
-                    </a:lnT>
-                    <a:lnB w="12700" cap="flat" cmpd="sng">
-                      <a:solidFill>
-                        <a:schemeClr val="dk1"/>
-                      </a:solidFill>
-                      <a:prstDash val="solid"/>
-                      <a:round/>
-                      <a:headEnd type="none" w="sm" len="sm"/>
-                      <a:tailEnd type="none" w="sm" len="sm"/>
-                    </a:lnB>
-                    <a:solidFill>
-                      <a:schemeClr val="lt1"/>
-                    </a:solidFill>
-                  </a:tcPr>
-                </a:tc>
-                <a:extLst>
-                  <a:ext uri="{0D108BD9-81ED-4DB2-BD59-A6C34878D82A}">
-                    <a16:rowId xmlns:a16="http://schemas.microsoft.com/office/drawing/2014/main" xmlns="" val="10000"/>
-                  </a:ext>
-                </a:extLst>
-              </a:tr>
-            </a:tbl>
-          </a:graphicData>
-        </a:graphic>
-      </p:graphicFrame>
-      <p:graphicFrame>
-        <p:nvGraphicFramePr>
           <p:cNvPr id="13" name="표 12"/>
           <p:cNvGraphicFramePr>
             <a:graphicFrameLocks noGrp="1"/>
@@ -8828,13 +8508,13 @@
           <p:nvPr>
             <p:extLst>
               <p:ext uri="{D42A27DB-BD31-4B8C-83A1-F6EECF244321}">
-                <p14:modId xmlns:p14="http://schemas.microsoft.com/office/powerpoint/2010/main" val="1478718460"/>
+                <p14:modId xmlns:p14="http://schemas.microsoft.com/office/powerpoint/2010/main" val="816014871"/>
               </p:ext>
             </p:extLst>
           </p:nvPr>
         </p:nvGraphicFramePr>
         <p:xfrm>
-          <a:off x="9037226" y="736572"/>
+          <a:off x="9138826" y="1761039"/>
           <a:ext cx="2536708" cy="655340"/>
         </p:xfrm>
         <a:graphic>
@@ -9059,16 +8739,92 @@
           </a:p>
         </p:txBody>
       </p:sp>
+      <p:sp>
+        <p:nvSpPr>
+          <p:cNvPr id="14" name="TextBox 13"/>
+          <p:cNvSpPr txBox="1"/>
+          <p:nvPr/>
+        </p:nvSpPr>
+        <p:spPr>
+          <a:xfrm>
+            <a:off x="380466" y="160866"/>
+            <a:ext cx="6455083" cy="584775"/>
+          </a:xfrm>
+          <a:prstGeom prst="rect">
+            <a:avLst/>
+          </a:prstGeom>
+          <a:noFill/>
+        </p:spPr>
+        <p:txBody>
+          <a:bodyPr wrap="square" rtlCol="0">
+            <a:spAutoFit/>
+          </a:bodyPr>
+          <a:lstStyle/>
+          <a:p>
+            <a:pPr lvl="0">
+              <a:buClr>
+                <a:srgbClr val="000000"/>
+              </a:buClr>
+              <a:buSzPts val="1500"/>
+              <a:defRPr/>
+            </a:pPr>
+            <a:r>
+              <a:rPr lang="ko-KR" altLang="en-US" sz="3200" dirty="0" smtClean="0">
+                <a:solidFill>
+                  <a:schemeClr val="bg1"/>
+                </a:solidFill>
+              </a:rPr>
+              <a:t>세미나 등록</a:t>
+            </a:r>
+            <a:r>
+              <a:rPr lang="ko-KR" altLang="en-US" dirty="0" smtClean="0">
+                <a:solidFill>
+                  <a:schemeClr val="bg1"/>
+                </a:solidFill>
+              </a:rPr>
+              <a:t> </a:t>
+            </a:r>
+            <a:r>
+              <a:rPr lang="en-US" altLang="ko-KR" dirty="0" smtClean="0">
+                <a:solidFill>
+                  <a:schemeClr val="bg1"/>
+                </a:solidFill>
+              </a:rPr>
+              <a:t>– </a:t>
+            </a:r>
+            <a:r>
+              <a:rPr lang="ko-KR" altLang="en-US" dirty="0" smtClean="0">
+                <a:solidFill>
+                  <a:schemeClr val="bg1"/>
+                </a:solidFill>
+              </a:rPr>
+              <a:t>완료 페이지</a:t>
+            </a:r>
+            <a:endParaRPr lang="ko-KR" altLang="en-US" dirty="0">
+              <a:solidFill>
+                <a:schemeClr val="bg1"/>
+              </a:solidFill>
+            </a:endParaRPr>
+          </a:p>
+        </p:txBody>
+      </p:sp>
     </p:spTree>
     <p:extLst>
       <p:ext uri="{BB962C8B-B14F-4D97-AF65-F5344CB8AC3E}">
-        <p14:creationId xmlns:p14="http://schemas.microsoft.com/office/powerpoint/2010/main" val="338278413"/>
+        <p14:creationId xmlns:p14="http://schemas.microsoft.com/office/powerpoint/2010/main" val="3291988675"/>
       </p:ext>
     </p:extLst>
   </p:cSld>
   <p:clrMapOvr>
     <a:masterClrMapping/>
   </p:clrMapOvr>
+  <p:timing>
+    <p:tnLst>
+      <p:par>
+        <p:cTn id="1" dur="indefinite" restart="never" nodeType="tmRoot"/>
+      </p:par>
+    </p:tnLst>
+  </p:timing>
 </p:sld>
 </file>
 
@@ -9096,14 +8852,14 @@
           <p:nvPr>
             <p:extLst>
               <p:ext uri="{D42A27DB-BD31-4B8C-83A1-F6EECF244321}">
-                <p14:modId xmlns:p14="http://schemas.microsoft.com/office/powerpoint/2010/main" val="2918578351"/>
+                <p14:modId xmlns:p14="http://schemas.microsoft.com/office/powerpoint/2010/main" val="2199116814"/>
               </p:ext>
             </p:extLst>
           </p:nvPr>
         </p:nvGraphicFramePr>
         <p:xfrm>
-          <a:off x="8750248" y="1664267"/>
-          <a:ext cx="2952330" cy="4739700"/>
+          <a:off x="8809515" y="2395382"/>
+          <a:ext cx="2952330" cy="4133574"/>
         </p:xfrm>
         <a:graphic>
           <a:graphicData uri="http://schemas.openxmlformats.org/drawingml/2006/table">
@@ -9115,14 +8871,14 @@
                 <a:gridCol w="289755">
                   <a:extLst>
                     <a:ext uri="{9D8B030D-6E8A-4147-A177-3AD203B41FA5}">
-                      <a16:colId xmlns="" xmlns:a16="http://schemas.microsoft.com/office/drawing/2014/main" val="20000"/>
+                      <a16:colId xmlns:a16="http://schemas.microsoft.com/office/drawing/2014/main" xmlns="" val="20000"/>
                     </a:ext>
                   </a:extLst>
                 </a:gridCol>
                 <a:gridCol w="2662575">
                   <a:extLst>
                     <a:ext uri="{9D8B030D-6E8A-4147-A177-3AD203B41FA5}">
-                      <a16:colId xmlns="" xmlns:a16="http://schemas.microsoft.com/office/drawing/2014/main" val="20001"/>
+                      <a16:colId xmlns:a16="http://schemas.microsoft.com/office/drawing/2014/main" xmlns="" val="20001"/>
                     </a:ext>
                   </a:extLst>
                 </a:gridCol>
@@ -9280,7 +9036,7 @@
                 </a:tc>
                 <a:extLst>
                   <a:ext uri="{0D108BD9-81ED-4DB2-BD59-A6C34878D82A}">
-                    <a16:rowId xmlns="" xmlns:a16="http://schemas.microsoft.com/office/drawing/2014/main" val="10000"/>
+                    <a16:rowId xmlns:a16="http://schemas.microsoft.com/office/drawing/2014/main" xmlns="" val="10000"/>
                   </a:ext>
                 </a:extLst>
               </a:tr>
@@ -9388,18 +9144,18 @@
                         <a:tabLst/>
                       </a:pPr>
                       <a:r>
-                        <a:rPr lang="ko-KR" altLang="en-US" sz="1300" b="0" u="none" strike="noStrike" cap="none" dirty="0" smtClean="0"/>
+                        <a:rPr lang="ko-KR" altLang="en-US" sz="1100" b="0" u="none" strike="noStrike" cap="none" dirty="0" smtClean="0"/>
                         <a:t>프로필 관리를 위한 메뉴로 클릭 시 </a:t>
                       </a:r>
                       <a:r>
-                        <a:rPr lang="ko-KR" altLang="en-US" sz="1300" b="0" u="none" strike="noStrike" cap="none" dirty="0" err="1" smtClean="0"/>
+                        <a:rPr lang="ko-KR" altLang="en-US" sz="1100" b="0" u="none" strike="noStrike" cap="none" dirty="0" err="1" smtClean="0"/>
                         <a:t>팝업창</a:t>
                       </a:r>
                       <a:r>
-                        <a:rPr lang="ko-KR" altLang="en-US" sz="1300" b="0" u="none" strike="noStrike" cap="none" dirty="0" smtClean="0"/>
+                        <a:rPr lang="ko-KR" altLang="en-US" sz="1100" b="0" u="none" strike="noStrike" cap="none" dirty="0" smtClean="0"/>
                         <a:t> 생성</a:t>
                       </a:r>
-                      <a:endParaRPr lang="en-US" altLang="ko-KR" sz="1300" b="0" u="none" strike="noStrike" cap="none" dirty="0" smtClean="0"/>
+                      <a:endParaRPr lang="en-US" altLang="ko-KR" sz="1100" b="0" u="none" strike="noStrike" cap="none" dirty="0" smtClean="0"/>
                     </a:p>
                   </a:txBody>
                   <a:tcPr marL="91451" marR="91451" marT="45725" marB="45725">
@@ -9446,7 +9202,7 @@
                 </a:tc>
                 <a:extLst>
                   <a:ext uri="{0D108BD9-81ED-4DB2-BD59-A6C34878D82A}">
-                    <a16:rowId xmlns="" xmlns:a16="http://schemas.microsoft.com/office/drawing/2014/main" val="10001"/>
+                    <a16:rowId xmlns:a16="http://schemas.microsoft.com/office/drawing/2014/main" xmlns="" val="10001"/>
                   </a:ext>
                 </a:extLst>
               </a:tr>
@@ -9545,38 +9301,38 @@
                         <a:buNone/>
                       </a:pPr>
                       <a:r>
-                        <a:rPr lang="ko-KR" altLang="en-US" sz="1300" b="0" u="none" strike="noStrike" cap="none" dirty="0" smtClean="0"/>
+                        <a:rPr lang="ko-KR" altLang="en-US" sz="1100" b="0" u="none" strike="noStrike" cap="none" dirty="0" smtClean="0"/>
                         <a:t>세미나 예약 리스트를 확인할 수 있는 페이지로 이동하며</a:t>
                       </a:r>
                       <a:r>
-                        <a:rPr lang="en-US" altLang="ko-KR" sz="1300" b="0" u="none" strike="noStrike" cap="none" dirty="0" smtClean="0"/>
+                        <a:rPr lang="en-US" altLang="ko-KR" sz="1100" b="0" u="none" strike="noStrike" cap="none" dirty="0" smtClean="0"/>
                         <a:t>, </a:t>
                       </a:r>
                       <a:r>
-                        <a:rPr lang="ko-KR" altLang="en-US" sz="1300" b="0" u="none" strike="noStrike" cap="none" dirty="0" smtClean="0"/>
+                        <a:rPr lang="ko-KR" altLang="en-US" sz="1100" b="0" u="none" strike="noStrike" cap="none" dirty="0" smtClean="0"/>
                         <a:t>호스트를 위한 장소선택</a:t>
                       </a:r>
                       <a:r>
-                        <a:rPr lang="en-US" altLang="ko-KR" sz="1300" b="0" u="none" strike="noStrike" cap="none" dirty="0" smtClean="0"/>
+                        <a:rPr lang="en-US" altLang="ko-KR" sz="1100" b="0" u="none" strike="noStrike" cap="none" dirty="0" smtClean="0"/>
                         <a:t>, </a:t>
                       </a:r>
                       <a:r>
-                        <a:rPr lang="ko-KR" altLang="en-US" sz="1300" b="0" u="none" strike="noStrike" cap="none" dirty="0" smtClean="0"/>
+                        <a:rPr lang="ko-KR" altLang="en-US" sz="1100" b="0" u="none" strike="noStrike" cap="none" dirty="0" smtClean="0"/>
                         <a:t>시간</a:t>
                       </a:r>
                       <a:r>
-                        <a:rPr lang="en-US" altLang="ko-KR" sz="1300" b="0" u="none" strike="noStrike" cap="none" dirty="0" smtClean="0"/>
+                        <a:rPr lang="en-US" altLang="ko-KR" sz="1100" b="0" u="none" strike="noStrike" cap="none" dirty="0" smtClean="0"/>
                         <a:t>, </a:t>
                       </a:r>
                       <a:r>
-                        <a:rPr lang="ko-KR" altLang="en-US" sz="1300" b="0" u="none" strike="noStrike" cap="none" dirty="0" smtClean="0"/>
+                        <a:rPr lang="ko-KR" altLang="en-US" sz="1100" b="0" u="none" strike="noStrike" cap="none" dirty="0" smtClean="0"/>
                         <a:t>세미나 이름을 확인할 수 있다</a:t>
                       </a:r>
                       <a:r>
-                        <a:rPr lang="en-US" altLang="ko-KR" sz="1300" b="0" u="none" strike="noStrike" cap="none" dirty="0" smtClean="0"/>
+                        <a:rPr lang="en-US" altLang="ko-KR" sz="1100" b="0" u="none" strike="noStrike" cap="none" dirty="0" smtClean="0"/>
                         <a:t>.</a:t>
                       </a:r>
-                      <a:endParaRPr lang="en-US" altLang="ko-KR" sz="1300" b="0" u="none" strike="noStrike" cap="none" dirty="0"/>
+                      <a:endParaRPr lang="en-US" altLang="ko-KR" sz="1100" b="0" u="none" strike="noStrike" cap="none" dirty="0"/>
                     </a:p>
                   </a:txBody>
                   <a:tcPr marL="91451" marR="91451" marT="45725" marB="45725">
@@ -9623,7 +9379,7 @@
                 </a:tc>
                 <a:extLst>
                   <a:ext uri="{0D108BD9-81ED-4DB2-BD59-A6C34878D82A}">
-                    <a16:rowId xmlns="" xmlns:a16="http://schemas.microsoft.com/office/drawing/2014/main" val="10002"/>
+                    <a16:rowId xmlns:a16="http://schemas.microsoft.com/office/drawing/2014/main" xmlns="" val="10002"/>
                   </a:ext>
                 </a:extLst>
               </a:tr>
@@ -9722,54 +9478,54 @@
                         <a:buNone/>
                       </a:pPr>
                       <a:r>
-                        <a:rPr lang="ko-KR" altLang="en-US" sz="1300" b="0" u="none" strike="noStrike" cap="none" dirty="0" err="1" smtClean="0"/>
+                        <a:rPr lang="ko-KR" altLang="en-US" sz="1100" b="0" u="none" strike="noStrike" cap="none" dirty="0" err="1" smtClean="0"/>
                         <a:t>밋업</a:t>
                       </a:r>
                       <a:r>
-                        <a:rPr lang="ko-KR" altLang="en-US" sz="1300" b="0" u="none" strike="noStrike" cap="none" dirty="0" smtClean="0"/>
+                        <a:rPr lang="ko-KR" altLang="en-US" sz="1100" b="0" u="none" strike="noStrike" cap="none" dirty="0" smtClean="0"/>
                         <a:t> 예약 리스트를 확인할 수 있는 페이지로 이동하며</a:t>
                       </a:r>
                       <a:r>
-                        <a:rPr lang="en-US" altLang="ko-KR" sz="1300" b="0" u="none" strike="noStrike" cap="none" dirty="0" smtClean="0"/>
+                        <a:rPr lang="en-US" altLang="ko-KR" sz="1100" b="0" u="none" strike="noStrike" cap="none" dirty="0" smtClean="0"/>
                         <a:t>, </a:t>
                       </a:r>
                       <a:r>
-                        <a:rPr lang="ko-KR" altLang="en-US" sz="1300" b="0" u="none" strike="noStrike" cap="none" dirty="0" err="1" smtClean="0"/>
+                        <a:rPr lang="ko-KR" altLang="en-US" sz="1100" b="0" u="none" strike="noStrike" cap="none" dirty="0" err="1" smtClean="0"/>
                         <a:t>밋업에</a:t>
                       </a:r>
                       <a:r>
-                        <a:rPr lang="ko-KR" altLang="en-US" sz="1300" b="0" u="none" strike="noStrike" cap="none" dirty="0" smtClean="0"/>
+                        <a:rPr lang="ko-KR" altLang="en-US" sz="1100" b="0" u="none" strike="noStrike" cap="none" dirty="0" smtClean="0"/>
                         <a:t> 대한 장소</a:t>
                       </a:r>
                       <a:r>
-                        <a:rPr lang="en-US" altLang="ko-KR" sz="1300" b="0" u="none" strike="noStrike" cap="none" dirty="0" smtClean="0"/>
+                        <a:rPr lang="en-US" altLang="ko-KR" sz="1100" b="0" u="none" strike="noStrike" cap="none" dirty="0" smtClean="0"/>
                         <a:t>, </a:t>
                       </a:r>
                       <a:r>
-                        <a:rPr lang="ko-KR" altLang="en-US" sz="1300" b="0" u="none" strike="noStrike" cap="none" dirty="0" smtClean="0"/>
+                        <a:rPr lang="ko-KR" altLang="en-US" sz="1100" b="0" u="none" strike="noStrike" cap="none" dirty="0" smtClean="0"/>
                         <a:t>시간</a:t>
                       </a:r>
                       <a:r>
-                        <a:rPr lang="en-US" altLang="ko-KR" sz="1300" b="0" u="none" strike="noStrike" cap="none" dirty="0" smtClean="0"/>
+                        <a:rPr lang="en-US" altLang="ko-KR" sz="1100" b="0" u="none" strike="noStrike" cap="none" dirty="0" smtClean="0"/>
                         <a:t>,</a:t>
                       </a:r>
                       <a:r>
-                        <a:rPr lang="en-US" altLang="ko-KR" sz="1300" b="0" u="none" strike="noStrike" cap="none" baseline="0" dirty="0" smtClean="0"/>
+                        <a:rPr lang="en-US" altLang="ko-KR" sz="1100" b="0" u="none" strike="noStrike" cap="none" baseline="0" dirty="0" smtClean="0"/>
                         <a:t> </a:t>
                       </a:r>
                       <a:r>
-                        <a:rPr lang="ko-KR" altLang="en-US" sz="1300" b="0" u="none" strike="noStrike" cap="none" baseline="0" dirty="0" smtClean="0"/>
+                        <a:rPr lang="ko-KR" altLang="en-US" sz="1100" b="0" u="none" strike="noStrike" cap="none" baseline="0" dirty="0" smtClean="0"/>
                         <a:t>이름 등을 확인할 </a:t>
                       </a:r>
                       <a:r>
-                        <a:rPr lang="ko-KR" altLang="en-US" sz="1300" b="0" u="none" strike="noStrike" cap="none" baseline="0" dirty="0" err="1" smtClean="0"/>
+                        <a:rPr lang="ko-KR" altLang="en-US" sz="1100" b="0" u="none" strike="noStrike" cap="none" baseline="0" dirty="0" err="1" smtClean="0"/>
                         <a:t>수있다</a:t>
                       </a:r>
                       <a:r>
-                        <a:rPr lang="en-US" altLang="ko-KR" sz="1300" b="0" u="none" strike="noStrike" cap="none" baseline="0" dirty="0" smtClean="0"/>
+                        <a:rPr lang="en-US" altLang="ko-KR" sz="1100" b="0" u="none" strike="noStrike" cap="none" baseline="0" dirty="0" smtClean="0"/>
                         <a:t>.</a:t>
                       </a:r>
-                      <a:endParaRPr lang="en-US" altLang="ko-KR" sz="1300" b="0" u="none" strike="noStrike" cap="none" dirty="0"/>
+                      <a:endParaRPr lang="en-US" altLang="ko-KR" sz="1100" b="0" u="none" strike="noStrike" cap="none" dirty="0"/>
                     </a:p>
                   </a:txBody>
                   <a:tcPr marL="91451" marR="91451" marT="45725" marB="45725">
@@ -9816,7 +9572,7 @@
                 </a:tc>
                 <a:extLst>
                   <a:ext uri="{0D108BD9-81ED-4DB2-BD59-A6C34878D82A}">
-                    <a16:rowId xmlns="" xmlns:a16="http://schemas.microsoft.com/office/drawing/2014/main" val="10003"/>
+                    <a16:rowId xmlns:a16="http://schemas.microsoft.com/office/drawing/2014/main" xmlns="" val="10003"/>
                   </a:ext>
                 </a:extLst>
               </a:tr>
@@ -9915,74 +9671,74 @@
                         <a:buNone/>
                       </a:pPr>
                       <a:r>
-                        <a:rPr lang="ko-KR" altLang="en-US" sz="1300" b="0" u="none" strike="noStrike" cap="none" dirty="0" smtClean="0"/>
+                        <a:rPr lang="ko-KR" altLang="en-US" sz="1100" b="0" u="none" strike="noStrike" cap="none" dirty="0" smtClean="0"/>
                         <a:t>문의</a:t>
                       </a:r>
                       <a:r>
-                        <a:rPr lang="ko-KR" altLang="en-US" sz="1300" b="0" u="none" strike="noStrike" cap="none" baseline="0" dirty="0" smtClean="0"/>
+                        <a:rPr lang="ko-KR" altLang="en-US" sz="1100" b="0" u="none" strike="noStrike" cap="none" baseline="0" dirty="0" smtClean="0"/>
                         <a:t> 사항 리스트를 확인할 수 있는 페이지로 이동하며</a:t>
                       </a:r>
                       <a:r>
-                        <a:rPr lang="en-US" altLang="ko-KR" sz="1300" b="0" u="none" strike="noStrike" cap="none" baseline="0" dirty="0" smtClean="0"/>
+                        <a:rPr lang="en-US" altLang="ko-KR" sz="1100" b="0" u="none" strike="noStrike" cap="none" baseline="0" dirty="0" smtClean="0"/>
                         <a:t>, </a:t>
                       </a:r>
                       <a:r>
-                        <a:rPr lang="ko-KR" altLang="en-US" sz="1300" b="0" u="none" strike="noStrike" cap="none" baseline="0" dirty="0" smtClean="0"/>
+                        <a:rPr lang="ko-KR" altLang="en-US" sz="1100" b="0" u="none" strike="noStrike" cap="none" baseline="0" dirty="0" smtClean="0"/>
                         <a:t>문의 사항은 서비스에 대한 </a:t>
                       </a:r>
                       <a:r>
-                        <a:rPr lang="en-US" altLang="ko-KR" sz="1300" b="0" u="none" strike="noStrike" cap="none" baseline="0" dirty="0" err="1" smtClean="0"/>
+                        <a:rPr lang="en-US" altLang="ko-KR" sz="1100" b="0" u="none" strike="noStrike" cap="none" baseline="0" dirty="0" err="1" smtClean="0"/>
                         <a:t>QnA</a:t>
                       </a:r>
                       <a:r>
-                        <a:rPr lang="en-US" altLang="ko-KR" sz="1300" b="0" u="none" strike="noStrike" cap="none" baseline="0" dirty="0" smtClean="0"/>
+                        <a:rPr lang="en-US" altLang="ko-KR" sz="1100" b="0" u="none" strike="noStrike" cap="none" baseline="0" dirty="0" smtClean="0"/>
                         <a:t>, </a:t>
                       </a:r>
                       <a:r>
-                        <a:rPr lang="ko-KR" altLang="en-US" sz="1300" b="0" u="none" strike="noStrike" cap="none" baseline="0" dirty="0" smtClean="0"/>
+                        <a:rPr lang="ko-KR" altLang="en-US" sz="1100" b="0" u="none" strike="noStrike" cap="none" baseline="0" dirty="0" smtClean="0"/>
                         <a:t>장소에 대한 </a:t>
                       </a:r>
                       <a:r>
-                        <a:rPr lang="en-US" altLang="ko-KR" sz="1300" b="0" u="none" strike="noStrike" cap="none" baseline="0" dirty="0" err="1" smtClean="0"/>
+                        <a:rPr lang="en-US" altLang="ko-KR" sz="1100" b="0" u="none" strike="noStrike" cap="none" baseline="0" dirty="0" err="1" smtClean="0"/>
                         <a:t>QnA</a:t>
                       </a:r>
                       <a:r>
-                        <a:rPr lang="en-US" altLang="ko-KR" sz="1300" b="0" u="none" strike="noStrike" cap="none" baseline="0" dirty="0" smtClean="0"/>
+                        <a:rPr lang="en-US" altLang="ko-KR" sz="1100" b="0" u="none" strike="noStrike" cap="none" baseline="0" dirty="0" smtClean="0"/>
                         <a:t>, </a:t>
                       </a:r>
                       <a:r>
-                        <a:rPr lang="ko-KR" altLang="en-US" sz="1300" b="0" u="none" strike="noStrike" cap="none" baseline="0" dirty="0" smtClean="0"/>
+                        <a:rPr lang="ko-KR" altLang="en-US" sz="1100" b="0" u="none" strike="noStrike" cap="none" baseline="0" dirty="0" smtClean="0"/>
                         <a:t>세미나에 관한 </a:t>
                       </a:r>
                       <a:r>
-                        <a:rPr lang="en-US" altLang="ko-KR" sz="1300" b="0" u="none" strike="noStrike" cap="none" baseline="0" dirty="0" err="1" smtClean="0"/>
+                        <a:rPr lang="en-US" altLang="ko-KR" sz="1100" b="0" u="none" strike="noStrike" cap="none" baseline="0" dirty="0" err="1" smtClean="0"/>
                         <a:t>QnA</a:t>
                       </a:r>
                       <a:r>
-                        <a:rPr lang="en-US" altLang="ko-KR" sz="1300" b="0" u="none" strike="noStrike" cap="none" baseline="0" dirty="0" smtClean="0"/>
+                        <a:rPr lang="en-US" altLang="ko-KR" sz="1100" b="0" u="none" strike="noStrike" cap="none" baseline="0" dirty="0" smtClean="0"/>
                         <a:t>, </a:t>
                       </a:r>
                       <a:r>
-                        <a:rPr lang="ko-KR" altLang="en-US" sz="1300" b="0" u="none" strike="noStrike" cap="none" baseline="0" dirty="0" err="1" smtClean="0"/>
+                        <a:rPr lang="ko-KR" altLang="en-US" sz="1100" b="0" u="none" strike="noStrike" cap="none" baseline="0" dirty="0" err="1" smtClean="0"/>
                         <a:t>밋업에</a:t>
                       </a:r>
                       <a:r>
-                        <a:rPr lang="ko-KR" altLang="en-US" sz="1300" b="0" u="none" strike="noStrike" cap="none" baseline="0" dirty="0" smtClean="0"/>
+                        <a:rPr lang="ko-KR" altLang="en-US" sz="1100" b="0" u="none" strike="noStrike" cap="none" baseline="0" dirty="0" smtClean="0"/>
                         <a:t> 관한 </a:t>
                       </a:r>
                       <a:r>
-                        <a:rPr lang="en-US" altLang="ko-KR" sz="1300" b="0" u="none" strike="noStrike" cap="none" baseline="0" dirty="0" err="1" smtClean="0"/>
+                        <a:rPr lang="en-US" altLang="ko-KR" sz="1100" b="0" u="none" strike="noStrike" cap="none" baseline="0" dirty="0" err="1" smtClean="0"/>
                         <a:t>QnA</a:t>
                       </a:r>
                       <a:r>
-                        <a:rPr lang="ko-KR" altLang="en-US" sz="1300" b="0" u="none" strike="noStrike" cap="none" baseline="0" dirty="0" smtClean="0"/>
+                        <a:rPr lang="ko-KR" altLang="en-US" sz="1100" b="0" u="none" strike="noStrike" cap="none" baseline="0" dirty="0" smtClean="0"/>
                         <a:t>로 이루어져 있다</a:t>
                       </a:r>
                       <a:r>
-                        <a:rPr lang="en-US" altLang="ko-KR" sz="1300" b="0" u="none" strike="noStrike" cap="none" baseline="0" dirty="0" smtClean="0"/>
+                        <a:rPr lang="en-US" altLang="ko-KR" sz="1100" b="0" u="none" strike="noStrike" cap="none" baseline="0" dirty="0" smtClean="0"/>
                         <a:t>.</a:t>
                       </a:r>
-                      <a:endParaRPr lang="en-US" altLang="ko-KR" sz="1300" b="0" u="none" strike="noStrike" cap="none" dirty="0"/>
+                      <a:endParaRPr lang="en-US" altLang="ko-KR" sz="1100" b="0" u="none" strike="noStrike" cap="none" dirty="0"/>
                     </a:p>
                   </a:txBody>
                   <a:tcPr marL="91451" marR="91451" marT="45725" marB="45725">
@@ -10029,7 +9785,7 @@
                 </a:tc>
                 <a:extLst>
                   <a:ext uri="{0D108BD9-81ED-4DB2-BD59-A6C34878D82A}">
-                    <a16:rowId xmlns="" xmlns:a16="http://schemas.microsoft.com/office/drawing/2014/main" val="10004"/>
+                    <a16:rowId xmlns:a16="http://schemas.microsoft.com/office/drawing/2014/main" xmlns="" val="10004"/>
                   </a:ext>
                 </a:extLst>
               </a:tr>
@@ -10128,62 +9884,62 @@
                         <a:buNone/>
                       </a:pPr>
                       <a:r>
-                        <a:rPr lang="ko-KR" altLang="en-US" sz="1300" b="0" u="none" strike="noStrike" cap="none" dirty="0" smtClean="0"/>
+                        <a:rPr lang="ko-KR" altLang="en-US" sz="1100" b="0" u="none" strike="noStrike" cap="none" dirty="0" smtClean="0"/>
                         <a:t>이용후기를 관리하는 페이지로 이동하며</a:t>
                       </a:r>
                       <a:r>
-                        <a:rPr lang="en-US" altLang="ko-KR" sz="1300" b="0" u="none" strike="noStrike" cap="none" dirty="0" smtClean="0"/>
+                        <a:rPr lang="en-US" altLang="ko-KR" sz="1100" b="0" u="none" strike="noStrike" cap="none" dirty="0" smtClean="0"/>
                         <a:t>, </a:t>
                       </a:r>
                       <a:r>
-                        <a:rPr lang="ko-KR" altLang="en-US" sz="1300" b="0" u="none" strike="noStrike" cap="none" dirty="0" smtClean="0"/>
+                        <a:rPr lang="ko-KR" altLang="en-US" sz="1100" b="0" u="none" strike="noStrike" cap="none" dirty="0" smtClean="0"/>
                         <a:t>이용후기는 </a:t>
                       </a:r>
                       <a:r>
-                        <a:rPr lang="ko-KR" altLang="en-US" sz="1300" b="0" u="none" strike="noStrike" cap="none" dirty="0" err="1" smtClean="0"/>
+                        <a:rPr lang="ko-KR" altLang="en-US" sz="1100" b="0" u="none" strike="noStrike" cap="none" dirty="0" err="1" smtClean="0"/>
                         <a:t>세미나존</a:t>
                       </a:r>
                       <a:r>
-                        <a:rPr lang="en-US" altLang="ko-KR" sz="1300" b="0" u="none" strike="noStrike" cap="none" dirty="0" smtClean="0"/>
+                        <a:rPr lang="en-US" altLang="ko-KR" sz="1100" b="0" u="none" strike="noStrike" cap="none" dirty="0" smtClean="0"/>
                         <a:t>,</a:t>
                       </a:r>
                       <a:r>
-                        <a:rPr lang="en-US" altLang="ko-KR" sz="1300" b="0" u="none" strike="noStrike" cap="none" baseline="0" dirty="0" smtClean="0"/>
+                        <a:rPr lang="en-US" altLang="ko-KR" sz="1100" b="0" u="none" strike="noStrike" cap="none" baseline="0" dirty="0" smtClean="0"/>
                         <a:t> </a:t>
                       </a:r>
                       <a:r>
-                        <a:rPr lang="ko-KR" altLang="en-US" sz="1300" b="0" u="none" strike="noStrike" cap="none" baseline="0" dirty="0" smtClean="0"/>
+                        <a:rPr lang="ko-KR" altLang="en-US" sz="1100" b="0" u="none" strike="noStrike" cap="none" baseline="0" dirty="0" smtClean="0"/>
                         <a:t>세미나</a:t>
                       </a:r>
                       <a:r>
-                        <a:rPr lang="en-US" altLang="ko-KR" sz="1300" b="0" u="none" strike="noStrike" cap="none" baseline="0" dirty="0" smtClean="0"/>
+                        <a:rPr lang="en-US" altLang="ko-KR" sz="1100" b="0" u="none" strike="noStrike" cap="none" baseline="0" dirty="0" smtClean="0"/>
                         <a:t>, </a:t>
                       </a:r>
                       <a:r>
-                        <a:rPr lang="ko-KR" altLang="en-US" sz="1300" b="0" u="none" strike="noStrike" cap="none" baseline="0" dirty="0" err="1" smtClean="0"/>
+                        <a:rPr lang="ko-KR" altLang="en-US" sz="1100" b="0" u="none" strike="noStrike" cap="none" baseline="0" dirty="0" err="1" smtClean="0"/>
                         <a:t>밋업에</a:t>
                       </a:r>
                       <a:r>
-                        <a:rPr lang="ko-KR" altLang="en-US" sz="1300" b="0" u="none" strike="noStrike" cap="none" baseline="0" dirty="0" smtClean="0"/>
+                        <a:rPr lang="ko-KR" altLang="en-US" sz="1100" b="0" u="none" strike="noStrike" cap="none" baseline="0" dirty="0" smtClean="0"/>
                         <a:t> 관한 후기로 총 </a:t>
                       </a:r>
                       <a:r>
-                        <a:rPr lang="en-US" altLang="ko-KR" sz="1300" b="0" u="none" strike="noStrike" cap="none" baseline="0" dirty="0" smtClean="0"/>
+                        <a:rPr lang="en-US" altLang="ko-KR" sz="1100" b="0" u="none" strike="noStrike" cap="none" baseline="0" dirty="0" smtClean="0"/>
                         <a:t>3</a:t>
                       </a:r>
                       <a:r>
-                        <a:rPr lang="ko-KR" altLang="en-US" sz="1300" b="0" u="none" strike="noStrike" cap="none" baseline="0" dirty="0" smtClean="0"/>
+                        <a:rPr lang="ko-KR" altLang="en-US" sz="1100" b="0" u="none" strike="noStrike" cap="none" baseline="0" dirty="0" smtClean="0"/>
                         <a:t>가지 종류가 </a:t>
                       </a:r>
                       <a:r>
-                        <a:rPr lang="ko-KR" altLang="en-US" sz="1300" b="0" u="none" strike="noStrike" cap="none" baseline="0" dirty="0" err="1" smtClean="0"/>
+                        <a:rPr lang="ko-KR" altLang="en-US" sz="1100" b="0" u="none" strike="noStrike" cap="none" baseline="0" dirty="0" err="1" smtClean="0"/>
                         <a:t>존재하낟</a:t>
                       </a:r>
                       <a:r>
-                        <a:rPr lang="en-US" altLang="ko-KR" sz="1300" b="0" u="none" strike="noStrike" cap="none" baseline="0" dirty="0" smtClean="0"/>
+                        <a:rPr lang="en-US" altLang="ko-KR" sz="1100" b="0" u="none" strike="noStrike" cap="none" baseline="0" dirty="0" smtClean="0"/>
                         <a:t>.</a:t>
                       </a:r>
-                      <a:endParaRPr lang="en-US" altLang="ko-KR" sz="1300" b="0" u="none" strike="noStrike" cap="none" dirty="0"/>
+                      <a:endParaRPr lang="en-US" altLang="ko-KR" sz="1100" b="0" u="none" strike="noStrike" cap="none" dirty="0"/>
                     </a:p>
                   </a:txBody>
                   <a:tcPr marL="91451" marR="91451" marT="45725" marB="45725">
@@ -10230,7 +9986,7 @@
                 </a:tc>
                 <a:extLst>
                   <a:ext uri="{0D108BD9-81ED-4DB2-BD59-A6C34878D82A}">
-                    <a16:rowId xmlns="" xmlns:a16="http://schemas.microsoft.com/office/drawing/2014/main" val="10005"/>
+                    <a16:rowId xmlns:a16="http://schemas.microsoft.com/office/drawing/2014/main" xmlns="" val="10005"/>
                   </a:ext>
                 </a:extLst>
               </a:tr>
@@ -10725,231 +10481,6 @@
       </p:sp>
       <p:graphicFrame>
         <p:nvGraphicFramePr>
-          <p:cNvPr id="18" name="Google Shape;165;g7c553259d1_0_81"/>
-          <p:cNvGraphicFramePr/>
-          <p:nvPr>
-            <p:extLst>
-              <p:ext uri="{D42A27DB-BD31-4B8C-83A1-F6EECF244321}">
-                <p14:modId xmlns:p14="http://schemas.microsoft.com/office/powerpoint/2010/main" val="3418888551"/>
-              </p:ext>
-            </p:extLst>
-          </p:nvPr>
-        </p:nvGraphicFramePr>
-        <p:xfrm>
-          <a:off x="1898479" y="205423"/>
-          <a:ext cx="6048672" cy="864096"/>
-        </p:xfrm>
-        <a:graphic>
-          <a:graphicData uri="http://schemas.openxmlformats.org/drawingml/2006/table">
-            <a:tbl>
-              <a:tblPr firstRow="1" bandRow="1">
-                <a:noFill/>
-              </a:tblPr>
-              <a:tblGrid>
-                <a:gridCol w="1152128">
-                  <a:extLst>
-                    <a:ext uri="{9D8B030D-6E8A-4147-A177-3AD203B41FA5}">
-                      <a16:colId xmlns:a16="http://schemas.microsoft.com/office/drawing/2014/main" xmlns="" val="20000"/>
-                    </a:ext>
-                  </a:extLst>
-                </a:gridCol>
-                <a:gridCol w="4896544">
-                  <a:extLst>
-                    <a:ext uri="{9D8B030D-6E8A-4147-A177-3AD203B41FA5}">
-                      <a16:colId xmlns:a16="http://schemas.microsoft.com/office/drawing/2014/main" xmlns="" val="20001"/>
-                    </a:ext>
-                  </a:extLst>
-                </a:gridCol>
-              </a:tblGrid>
-              <a:tr h="864096">
-                <a:tc>
-                  <a:txBody>
-                    <a:bodyPr/>
-                    <a:lstStyle/>
-                    <a:p>
-                      <a:pPr marL="0" marR="0" lvl="0" indent="0" algn="ctr" rtl="0">
-                        <a:lnSpc>
-                          <a:spcPct val="100000"/>
-                        </a:lnSpc>
-                        <a:spcBef>
-                          <a:spcPts val="0"/>
-                        </a:spcBef>
-                        <a:spcAft>
-                          <a:spcPts val="0"/>
-                        </a:spcAft>
-                        <a:buClr>
-                          <a:srgbClr val="000000"/>
-                        </a:buClr>
-                        <a:buSzPts val="1500"/>
-                        <a:buFont typeface="Arial"/>
-                        <a:buNone/>
-                      </a:pPr>
-                      <a:r>
-                        <a:rPr lang="ko-KR" altLang="en-US" sz="1500" b="0" u="none" strike="noStrike" cap="none" dirty="0" err="1" smtClean="0">
-                          <a:solidFill>
-                            <a:schemeClr val="dk1"/>
-                          </a:solidFill>
-                        </a:rPr>
-                        <a:t>화면명</a:t>
-                      </a:r>
-                      <a:endParaRPr sz="1500" b="0" u="none" strike="noStrike" cap="none" dirty="0">
-                        <a:solidFill>
-                          <a:schemeClr val="dk1"/>
-                        </a:solidFill>
-                      </a:endParaRPr>
-                    </a:p>
-                  </a:txBody>
-                  <a:tcPr marL="74304" marR="74304" marT="45725" marB="45725" anchor="ctr">
-                    <a:lnL w="12700" cap="flat" cmpd="sng">
-                      <a:solidFill>
-                        <a:schemeClr val="dk1"/>
-                      </a:solidFill>
-                      <a:prstDash val="solid"/>
-                      <a:round/>
-                      <a:headEnd type="none" w="sm" len="sm"/>
-                      <a:tailEnd type="none" w="sm" len="sm"/>
-                    </a:lnL>
-                    <a:lnR w="12700" cap="flat" cmpd="sng">
-                      <a:solidFill>
-                        <a:schemeClr val="dk1"/>
-                      </a:solidFill>
-                      <a:prstDash val="solid"/>
-                      <a:round/>
-                      <a:headEnd type="none" w="sm" len="sm"/>
-                      <a:tailEnd type="none" w="sm" len="sm"/>
-                    </a:lnR>
-                    <a:lnT w="12700" cap="flat" cmpd="sng">
-                      <a:solidFill>
-                        <a:schemeClr val="dk1"/>
-                      </a:solidFill>
-                      <a:prstDash val="solid"/>
-                      <a:round/>
-                      <a:headEnd type="none" w="sm" len="sm"/>
-                      <a:tailEnd type="none" w="sm" len="sm"/>
-                    </a:lnT>
-                    <a:lnB w="12700" cap="flat" cmpd="sng">
-                      <a:solidFill>
-                        <a:schemeClr val="dk1"/>
-                      </a:solidFill>
-                      <a:prstDash val="solid"/>
-                      <a:round/>
-                      <a:headEnd type="none" w="sm" len="sm"/>
-                      <a:tailEnd type="none" w="sm" len="sm"/>
-                    </a:lnB>
-                    <a:solidFill>
-                      <a:srgbClr val="D8D8D8"/>
-                    </a:solidFill>
-                  </a:tcPr>
-                </a:tc>
-                <a:tc>
-                  <a:txBody>
-                    <a:bodyPr/>
-                    <a:lstStyle/>
-                    <a:p>
-                      <a:pPr marL="0" marR="0" lvl="0" indent="0" algn="ctr" defTabSz="914400" rtl="0" eaLnBrk="1" fontAlgn="auto" latinLnBrk="1" hangingPunct="1">
-                        <a:lnSpc>
-                          <a:spcPct val="100000"/>
-                        </a:lnSpc>
-                        <a:spcBef>
-                          <a:spcPts val="0"/>
-                        </a:spcBef>
-                        <a:spcAft>
-                          <a:spcPts val="0"/>
-                        </a:spcAft>
-                        <a:buClr>
-                          <a:srgbClr val="000000"/>
-                        </a:buClr>
-                        <a:buSzPts val="1500"/>
-                        <a:buFont typeface="Arial"/>
-                        <a:buNone/>
-                        <a:tabLst/>
-                        <a:defRPr/>
-                      </a:pPr>
-                      <a:r>
-                        <a:rPr lang="ko-KR" altLang="en-US" sz="2800" b="0" u="none" strike="noStrike" cap="none" baseline="0" dirty="0" err="1" smtClean="0">
-                          <a:solidFill>
-                            <a:schemeClr val="dk1"/>
-                          </a:solidFill>
-                        </a:rPr>
-                        <a:t>마이페이지</a:t>
-                      </a:r>
-                      <a:r>
-                        <a:rPr lang="en-US" altLang="ko-KR" sz="1500" b="0" u="none" strike="noStrike" cap="none" baseline="0" dirty="0" smtClean="0">
-                          <a:solidFill>
-                            <a:schemeClr val="dk1"/>
-                          </a:solidFill>
-                        </a:rPr>
-                        <a:t>– </a:t>
-                      </a:r>
-                      <a:r>
-                        <a:rPr lang="ko-KR" altLang="en-US" sz="1500" b="0" u="none" strike="noStrike" cap="none" baseline="0" dirty="0" err="1" smtClean="0">
-                          <a:solidFill>
-                            <a:schemeClr val="dk1"/>
-                          </a:solidFill>
-                        </a:rPr>
-                        <a:t>메인화면</a:t>
-                      </a:r>
-                      <a:endParaRPr lang="ko-KR" altLang="en-US" sz="1500" b="0" u="none" strike="noStrike" cap="none" dirty="0" smtClean="0">
-                        <a:solidFill>
-                          <a:schemeClr val="dk1"/>
-                        </a:solidFill>
-                      </a:endParaRPr>
-                    </a:p>
-                  </a:txBody>
-                  <a:tcPr marL="74304" marR="74304" marT="45725" marB="45725" anchor="ctr">
-                    <a:lnL w="12700" cap="flat" cmpd="sng">
-                      <a:solidFill>
-                        <a:schemeClr val="dk1"/>
-                      </a:solidFill>
-                      <a:prstDash val="solid"/>
-                      <a:round/>
-                      <a:headEnd type="none" w="sm" len="sm"/>
-                      <a:tailEnd type="none" w="sm" len="sm"/>
-                    </a:lnL>
-                    <a:lnR w="12700" cap="flat" cmpd="sng">
-                      <a:solidFill>
-                        <a:schemeClr val="dk1"/>
-                      </a:solidFill>
-                      <a:prstDash val="solid"/>
-                      <a:round/>
-                      <a:headEnd type="none" w="sm" len="sm"/>
-                      <a:tailEnd type="none" w="sm" len="sm"/>
-                    </a:lnR>
-                    <a:lnT w="12700" cap="flat" cmpd="sng">
-                      <a:solidFill>
-                        <a:schemeClr val="dk1"/>
-                      </a:solidFill>
-                      <a:prstDash val="solid"/>
-                      <a:round/>
-                      <a:headEnd type="none" w="sm" len="sm"/>
-                      <a:tailEnd type="none" w="sm" len="sm"/>
-                    </a:lnT>
-                    <a:lnB w="12700" cap="flat" cmpd="sng">
-                      <a:solidFill>
-                        <a:schemeClr val="dk1"/>
-                      </a:solidFill>
-                      <a:prstDash val="solid"/>
-                      <a:round/>
-                      <a:headEnd type="none" w="sm" len="sm"/>
-                      <a:tailEnd type="none" w="sm" len="sm"/>
-                    </a:lnB>
-                    <a:solidFill>
-                      <a:schemeClr val="lt1"/>
-                    </a:solidFill>
-                  </a:tcPr>
-                </a:tc>
-                <a:extLst>
-                  <a:ext uri="{0D108BD9-81ED-4DB2-BD59-A6C34878D82A}">
-                    <a16:rowId xmlns:a16="http://schemas.microsoft.com/office/drawing/2014/main" xmlns="" val="10000"/>
-                  </a:ext>
-                </a:extLst>
-              </a:tr>
-            </a:tbl>
-          </a:graphicData>
-        </a:graphic>
-      </p:graphicFrame>
-      <p:graphicFrame>
-        <p:nvGraphicFramePr>
           <p:cNvPr id="19" name="표 18"/>
           <p:cNvGraphicFramePr>
             <a:graphicFrameLocks noGrp="1"/>
@@ -10957,13 +10488,13 @@
           <p:nvPr>
             <p:extLst>
               <p:ext uri="{D42A27DB-BD31-4B8C-83A1-F6EECF244321}">
-                <p14:modId xmlns:p14="http://schemas.microsoft.com/office/powerpoint/2010/main" val="64524721"/>
+                <p14:modId xmlns:p14="http://schemas.microsoft.com/office/powerpoint/2010/main" val="3418140837"/>
               </p:ext>
             </p:extLst>
           </p:nvPr>
         </p:nvGraphicFramePr>
         <p:xfrm>
-          <a:off x="9037226" y="736572"/>
+          <a:off x="8986426" y="1484555"/>
           <a:ext cx="2536708" cy="655340"/>
         </p:xfrm>
         <a:graphic>
@@ -11141,16 +10672,92 @@
           </a:graphicData>
         </a:graphic>
       </p:graphicFrame>
+      <p:sp>
+        <p:nvSpPr>
+          <p:cNvPr id="13" name="TextBox 12"/>
+          <p:cNvSpPr txBox="1"/>
+          <p:nvPr/>
+        </p:nvSpPr>
+        <p:spPr>
+          <a:xfrm>
+            <a:off x="380466" y="160866"/>
+            <a:ext cx="6455083" cy="584775"/>
+          </a:xfrm>
+          <a:prstGeom prst="rect">
+            <a:avLst/>
+          </a:prstGeom>
+          <a:noFill/>
+        </p:spPr>
+        <p:txBody>
+          <a:bodyPr wrap="square" rtlCol="0">
+            <a:spAutoFit/>
+          </a:bodyPr>
+          <a:lstStyle/>
+          <a:p>
+            <a:pPr lvl="0">
+              <a:buClr>
+                <a:srgbClr val="000000"/>
+              </a:buClr>
+              <a:buSzPts val="1500"/>
+              <a:defRPr/>
+            </a:pPr>
+            <a:r>
+              <a:rPr lang="ko-KR" altLang="en-US" sz="3200" dirty="0" err="1" smtClean="0">
+                <a:solidFill>
+                  <a:schemeClr val="bg1"/>
+                </a:solidFill>
+              </a:rPr>
+              <a:t>마이페이지</a:t>
+            </a:r>
+            <a:r>
+              <a:rPr lang="ko-KR" altLang="en-US" dirty="0" smtClean="0">
+                <a:solidFill>
+                  <a:schemeClr val="bg1"/>
+                </a:solidFill>
+              </a:rPr>
+              <a:t> </a:t>
+            </a:r>
+            <a:r>
+              <a:rPr lang="en-US" altLang="ko-KR" dirty="0" smtClean="0">
+                <a:solidFill>
+                  <a:schemeClr val="bg1"/>
+                </a:solidFill>
+              </a:rPr>
+              <a:t>– </a:t>
+            </a:r>
+            <a:r>
+              <a:rPr lang="ko-KR" altLang="en-US" dirty="0" err="1" smtClean="0">
+                <a:solidFill>
+                  <a:schemeClr val="bg1"/>
+                </a:solidFill>
+              </a:rPr>
+              <a:t>메인화면</a:t>
+            </a:r>
+            <a:endParaRPr lang="ko-KR" altLang="en-US" dirty="0">
+              <a:solidFill>
+                <a:schemeClr val="bg1"/>
+              </a:solidFill>
+            </a:endParaRPr>
+          </a:p>
+        </p:txBody>
+      </p:sp>
     </p:spTree>
     <p:extLst>
       <p:ext uri="{BB962C8B-B14F-4D97-AF65-F5344CB8AC3E}">
-        <p14:creationId xmlns:p14="http://schemas.microsoft.com/office/powerpoint/2010/main" val="90045886"/>
+        <p14:creationId xmlns:p14="http://schemas.microsoft.com/office/powerpoint/2010/main" val="3215576222"/>
       </p:ext>
     </p:extLst>
   </p:cSld>
   <p:clrMapOvr>
     <a:masterClrMapping/>
   </p:clrMapOvr>
+  <p:timing>
+    <p:tnLst>
+      <p:par>
+        <p:cTn id="1" dur="indefinite" restart="never" nodeType="tmRoot"/>
+      </p:par>
+    </p:tnLst>
+  </p:timing>
 </p:sld>
 </file>
 
@@ -11178,13 +10785,13 @@
           <p:nvPr>
             <p:extLst>
               <p:ext uri="{D42A27DB-BD31-4B8C-83A1-F6EECF244321}">
-                <p14:modId xmlns:p14="http://schemas.microsoft.com/office/powerpoint/2010/main" val="2401244725"/>
+                <p14:modId xmlns:p14="http://schemas.microsoft.com/office/powerpoint/2010/main" val="2012440292"/>
               </p:ext>
             </p:extLst>
           </p:nvPr>
         </p:nvGraphicFramePr>
         <p:xfrm>
-          <a:off x="8741782" y="2054415"/>
+          <a:off x="8724849" y="3074894"/>
           <a:ext cx="2952330" cy="2023028"/>
         </p:xfrm>
         <a:graphic>
@@ -11197,14 +10804,14 @@
                 <a:gridCol w="289755">
                   <a:extLst>
                     <a:ext uri="{9D8B030D-6E8A-4147-A177-3AD203B41FA5}">
-                      <a16:colId xmlns="" xmlns:a16="http://schemas.microsoft.com/office/drawing/2014/main" val="20000"/>
+                      <a16:colId xmlns:a16="http://schemas.microsoft.com/office/drawing/2014/main" xmlns="" val="20000"/>
                     </a:ext>
                   </a:extLst>
                 </a:gridCol>
                 <a:gridCol w="2662575">
                   <a:extLst>
                     <a:ext uri="{9D8B030D-6E8A-4147-A177-3AD203B41FA5}">
-                      <a16:colId xmlns="" xmlns:a16="http://schemas.microsoft.com/office/drawing/2014/main" val="20001"/>
+                      <a16:colId xmlns:a16="http://schemas.microsoft.com/office/drawing/2014/main" xmlns="" val="20001"/>
                     </a:ext>
                   </a:extLst>
                 </a:gridCol>
@@ -11370,7 +10977,7 @@
                 </a:tc>
                 <a:extLst>
                   <a:ext uri="{0D108BD9-81ED-4DB2-BD59-A6C34878D82A}">
-                    <a16:rowId xmlns="" xmlns:a16="http://schemas.microsoft.com/office/drawing/2014/main" val="10000"/>
+                    <a16:rowId xmlns:a16="http://schemas.microsoft.com/office/drawing/2014/main" xmlns="" val="10000"/>
                   </a:ext>
                 </a:extLst>
               </a:tr>
@@ -11552,7 +11159,7 @@
                 </a:tc>
                 <a:extLst>
                   <a:ext uri="{0D108BD9-81ED-4DB2-BD59-A6C34878D82A}">
-                    <a16:rowId xmlns="" xmlns:a16="http://schemas.microsoft.com/office/drawing/2014/main" val="10001"/>
+                    <a16:rowId xmlns:a16="http://schemas.microsoft.com/office/drawing/2014/main" xmlns="" val="10001"/>
                   </a:ext>
                 </a:extLst>
               </a:tr>
@@ -11713,7 +11320,7 @@
                 </a:tc>
                 <a:extLst>
                   <a:ext uri="{0D108BD9-81ED-4DB2-BD59-A6C34878D82A}">
-                    <a16:rowId xmlns="" xmlns:a16="http://schemas.microsoft.com/office/drawing/2014/main" val="10002"/>
+                    <a16:rowId xmlns:a16="http://schemas.microsoft.com/office/drawing/2014/main" xmlns="" val="10002"/>
                   </a:ext>
                 </a:extLst>
               </a:tr>
@@ -12182,231 +11789,6 @@
       </p:sp>
       <p:graphicFrame>
         <p:nvGraphicFramePr>
-          <p:cNvPr id="18" name="Google Shape;165;g7c553259d1_0_81"/>
-          <p:cNvGraphicFramePr/>
-          <p:nvPr>
-            <p:extLst>
-              <p:ext uri="{D42A27DB-BD31-4B8C-83A1-F6EECF244321}">
-                <p14:modId xmlns:p14="http://schemas.microsoft.com/office/powerpoint/2010/main" val="1278725247"/>
-              </p:ext>
-            </p:extLst>
-          </p:nvPr>
-        </p:nvGraphicFramePr>
-        <p:xfrm>
-          <a:off x="1898479" y="205423"/>
-          <a:ext cx="6048672" cy="864096"/>
-        </p:xfrm>
-        <a:graphic>
-          <a:graphicData uri="http://schemas.openxmlformats.org/drawingml/2006/table">
-            <a:tbl>
-              <a:tblPr firstRow="1" bandRow="1">
-                <a:noFill/>
-              </a:tblPr>
-              <a:tblGrid>
-                <a:gridCol w="1152128">
-                  <a:extLst>
-                    <a:ext uri="{9D8B030D-6E8A-4147-A177-3AD203B41FA5}">
-                      <a16:colId xmlns:a16="http://schemas.microsoft.com/office/drawing/2014/main" xmlns="" val="20000"/>
-                    </a:ext>
-                  </a:extLst>
-                </a:gridCol>
-                <a:gridCol w="4896544">
-                  <a:extLst>
-                    <a:ext uri="{9D8B030D-6E8A-4147-A177-3AD203B41FA5}">
-                      <a16:colId xmlns:a16="http://schemas.microsoft.com/office/drawing/2014/main" xmlns="" val="20001"/>
-                    </a:ext>
-                  </a:extLst>
-                </a:gridCol>
-              </a:tblGrid>
-              <a:tr h="864096">
-                <a:tc>
-                  <a:txBody>
-                    <a:bodyPr/>
-                    <a:lstStyle/>
-                    <a:p>
-                      <a:pPr marL="0" marR="0" lvl="0" indent="0" algn="ctr" rtl="0">
-                        <a:lnSpc>
-                          <a:spcPct val="100000"/>
-                        </a:lnSpc>
-                        <a:spcBef>
-                          <a:spcPts val="0"/>
-                        </a:spcBef>
-                        <a:spcAft>
-                          <a:spcPts val="0"/>
-                        </a:spcAft>
-                        <a:buClr>
-                          <a:srgbClr val="000000"/>
-                        </a:buClr>
-                        <a:buSzPts val="1500"/>
-                        <a:buFont typeface="Arial"/>
-                        <a:buNone/>
-                      </a:pPr>
-                      <a:r>
-                        <a:rPr lang="ko-KR" altLang="en-US" sz="1500" b="0" u="none" strike="noStrike" cap="none" dirty="0" err="1" smtClean="0">
-                          <a:solidFill>
-                            <a:schemeClr val="dk1"/>
-                          </a:solidFill>
-                        </a:rPr>
-                        <a:t>화면명</a:t>
-                      </a:r>
-                      <a:endParaRPr sz="1500" b="0" u="none" strike="noStrike" cap="none" dirty="0">
-                        <a:solidFill>
-                          <a:schemeClr val="dk1"/>
-                        </a:solidFill>
-                      </a:endParaRPr>
-                    </a:p>
-                  </a:txBody>
-                  <a:tcPr marL="74304" marR="74304" marT="45725" marB="45725" anchor="ctr">
-                    <a:lnL w="12700" cap="flat" cmpd="sng">
-                      <a:solidFill>
-                        <a:schemeClr val="dk1"/>
-                      </a:solidFill>
-                      <a:prstDash val="solid"/>
-                      <a:round/>
-                      <a:headEnd type="none" w="sm" len="sm"/>
-                      <a:tailEnd type="none" w="sm" len="sm"/>
-                    </a:lnL>
-                    <a:lnR w="12700" cap="flat" cmpd="sng">
-                      <a:solidFill>
-                        <a:schemeClr val="dk1"/>
-                      </a:solidFill>
-                      <a:prstDash val="solid"/>
-                      <a:round/>
-                      <a:headEnd type="none" w="sm" len="sm"/>
-                      <a:tailEnd type="none" w="sm" len="sm"/>
-                    </a:lnR>
-                    <a:lnT w="12700" cap="flat" cmpd="sng">
-                      <a:solidFill>
-                        <a:schemeClr val="dk1"/>
-                      </a:solidFill>
-                      <a:prstDash val="solid"/>
-                      <a:round/>
-                      <a:headEnd type="none" w="sm" len="sm"/>
-                      <a:tailEnd type="none" w="sm" len="sm"/>
-                    </a:lnT>
-                    <a:lnB w="12700" cap="flat" cmpd="sng">
-                      <a:solidFill>
-                        <a:schemeClr val="dk1"/>
-                      </a:solidFill>
-                      <a:prstDash val="solid"/>
-                      <a:round/>
-                      <a:headEnd type="none" w="sm" len="sm"/>
-                      <a:tailEnd type="none" w="sm" len="sm"/>
-                    </a:lnB>
-                    <a:solidFill>
-                      <a:srgbClr val="D8D8D8"/>
-                    </a:solidFill>
-                  </a:tcPr>
-                </a:tc>
-                <a:tc>
-                  <a:txBody>
-                    <a:bodyPr/>
-                    <a:lstStyle/>
-                    <a:p>
-                      <a:pPr marL="0" marR="0" lvl="0" indent="0" algn="ctr" defTabSz="914400" rtl="0" eaLnBrk="1" fontAlgn="auto" latinLnBrk="1" hangingPunct="1">
-                        <a:lnSpc>
-                          <a:spcPct val="100000"/>
-                        </a:lnSpc>
-                        <a:spcBef>
-                          <a:spcPts val="0"/>
-                        </a:spcBef>
-                        <a:spcAft>
-                          <a:spcPts val="0"/>
-                        </a:spcAft>
-                        <a:buClr>
-                          <a:srgbClr val="000000"/>
-                        </a:buClr>
-                        <a:buSzPts val="1500"/>
-                        <a:buFont typeface="Arial"/>
-                        <a:buNone/>
-                        <a:tabLst/>
-                        <a:defRPr/>
-                      </a:pPr>
-                      <a:r>
-                        <a:rPr lang="ko-KR" altLang="en-US" sz="2800" b="0" u="none" strike="noStrike" cap="none" baseline="0" dirty="0" err="1" smtClean="0">
-                          <a:solidFill>
-                            <a:schemeClr val="dk1"/>
-                          </a:solidFill>
-                        </a:rPr>
-                        <a:t>마이페이지</a:t>
-                      </a:r>
-                      <a:r>
-                        <a:rPr lang="en-US" altLang="ko-KR" sz="1500" b="0" u="none" strike="noStrike" cap="none" baseline="0" dirty="0" smtClean="0">
-                          <a:solidFill>
-                            <a:schemeClr val="dk1"/>
-                          </a:solidFill>
-                        </a:rPr>
-                        <a:t>– </a:t>
-                      </a:r>
-                      <a:r>
-                        <a:rPr lang="ko-KR" altLang="en-US" sz="1500" b="0" u="none" strike="noStrike" cap="none" baseline="0" dirty="0" smtClean="0">
-                          <a:solidFill>
-                            <a:schemeClr val="dk1"/>
-                          </a:solidFill>
-                        </a:rPr>
-                        <a:t>세미나 예약 리스트</a:t>
-                      </a:r>
-                      <a:endParaRPr lang="ko-KR" altLang="en-US" sz="1500" b="0" u="none" strike="noStrike" cap="none" dirty="0" smtClean="0">
-                        <a:solidFill>
-                          <a:schemeClr val="dk1"/>
-                        </a:solidFill>
-                      </a:endParaRPr>
-                    </a:p>
-                  </a:txBody>
-                  <a:tcPr marL="74304" marR="74304" marT="45725" marB="45725" anchor="ctr">
-                    <a:lnL w="12700" cap="flat" cmpd="sng">
-                      <a:solidFill>
-                        <a:schemeClr val="dk1"/>
-                      </a:solidFill>
-                      <a:prstDash val="solid"/>
-                      <a:round/>
-                      <a:headEnd type="none" w="sm" len="sm"/>
-                      <a:tailEnd type="none" w="sm" len="sm"/>
-                    </a:lnL>
-                    <a:lnR w="12700" cap="flat" cmpd="sng">
-                      <a:solidFill>
-                        <a:schemeClr val="dk1"/>
-                      </a:solidFill>
-                      <a:prstDash val="solid"/>
-                      <a:round/>
-                      <a:headEnd type="none" w="sm" len="sm"/>
-                      <a:tailEnd type="none" w="sm" len="sm"/>
-                    </a:lnR>
-                    <a:lnT w="12700" cap="flat" cmpd="sng">
-                      <a:solidFill>
-                        <a:schemeClr val="dk1"/>
-                      </a:solidFill>
-                      <a:prstDash val="solid"/>
-                      <a:round/>
-                      <a:headEnd type="none" w="sm" len="sm"/>
-                      <a:tailEnd type="none" w="sm" len="sm"/>
-                    </a:lnT>
-                    <a:lnB w="12700" cap="flat" cmpd="sng">
-                      <a:solidFill>
-                        <a:schemeClr val="dk1"/>
-                      </a:solidFill>
-                      <a:prstDash val="solid"/>
-                      <a:round/>
-                      <a:headEnd type="none" w="sm" len="sm"/>
-                      <a:tailEnd type="none" w="sm" len="sm"/>
-                    </a:lnB>
-                    <a:solidFill>
-                      <a:schemeClr val="lt1"/>
-                    </a:solidFill>
-                  </a:tcPr>
-                </a:tc>
-                <a:extLst>
-                  <a:ext uri="{0D108BD9-81ED-4DB2-BD59-A6C34878D82A}">
-                    <a16:rowId xmlns:a16="http://schemas.microsoft.com/office/drawing/2014/main" xmlns="" val="10000"/>
-                  </a:ext>
-                </a:extLst>
-              </a:tr>
-            </a:tbl>
-          </a:graphicData>
-        </a:graphic>
-      </p:graphicFrame>
-      <p:graphicFrame>
-        <p:nvGraphicFramePr>
           <p:cNvPr id="19" name="표 18"/>
           <p:cNvGraphicFramePr>
             <a:graphicFrameLocks noGrp="1"/>
@@ -12414,13 +11796,13 @@
           <p:nvPr>
             <p:extLst>
               <p:ext uri="{D42A27DB-BD31-4B8C-83A1-F6EECF244321}">
-                <p14:modId xmlns:p14="http://schemas.microsoft.com/office/powerpoint/2010/main" val="909243410"/>
+                <p14:modId xmlns:p14="http://schemas.microsoft.com/office/powerpoint/2010/main" val="1679609570"/>
               </p:ext>
             </p:extLst>
           </p:nvPr>
         </p:nvGraphicFramePr>
         <p:xfrm>
-          <a:off x="9037226" y="736572"/>
+          <a:off x="9020293" y="1757051"/>
           <a:ext cx="2536708" cy="655340"/>
         </p:xfrm>
         <a:graphic>
@@ -12598,16 +11980,92 @@
           </a:graphicData>
         </a:graphic>
       </p:graphicFrame>
+      <p:sp>
+        <p:nvSpPr>
+          <p:cNvPr id="20" name="TextBox 19"/>
+          <p:cNvSpPr txBox="1"/>
+          <p:nvPr/>
+        </p:nvSpPr>
+        <p:spPr>
+          <a:xfrm>
+            <a:off x="380466" y="160866"/>
+            <a:ext cx="6455083" cy="584775"/>
+          </a:xfrm>
+          <a:prstGeom prst="rect">
+            <a:avLst/>
+          </a:prstGeom>
+          <a:noFill/>
+        </p:spPr>
+        <p:txBody>
+          <a:bodyPr wrap="square" rtlCol="0">
+            <a:spAutoFit/>
+          </a:bodyPr>
+          <a:lstStyle/>
+          <a:p>
+            <a:pPr lvl="0">
+              <a:buClr>
+                <a:srgbClr val="000000"/>
+              </a:buClr>
+              <a:buSzPts val="1500"/>
+              <a:defRPr/>
+            </a:pPr>
+            <a:r>
+              <a:rPr lang="ko-KR" altLang="en-US" sz="3200" dirty="0" err="1" smtClean="0">
+                <a:solidFill>
+                  <a:schemeClr val="bg1"/>
+                </a:solidFill>
+              </a:rPr>
+              <a:t>마이페이지</a:t>
+            </a:r>
+            <a:r>
+              <a:rPr lang="ko-KR" altLang="en-US" dirty="0" smtClean="0">
+                <a:solidFill>
+                  <a:schemeClr val="bg1"/>
+                </a:solidFill>
+              </a:rPr>
+              <a:t> </a:t>
+            </a:r>
+            <a:r>
+              <a:rPr lang="en-US" altLang="ko-KR" dirty="0" smtClean="0">
+                <a:solidFill>
+                  <a:schemeClr val="bg1"/>
+                </a:solidFill>
+              </a:rPr>
+              <a:t>– </a:t>
+            </a:r>
+            <a:r>
+              <a:rPr lang="ko-KR" altLang="en-US" dirty="0" smtClean="0">
+                <a:solidFill>
+                  <a:schemeClr val="bg1"/>
+                </a:solidFill>
+              </a:rPr>
+              <a:t>세미나 예약 리스트</a:t>
+            </a:r>
+            <a:endParaRPr lang="ko-KR" altLang="en-US" dirty="0">
+              <a:solidFill>
+                <a:schemeClr val="bg1"/>
+              </a:solidFill>
+            </a:endParaRPr>
+          </a:p>
+        </p:txBody>
+      </p:sp>
     </p:spTree>
     <p:extLst>
       <p:ext uri="{BB962C8B-B14F-4D97-AF65-F5344CB8AC3E}">
-        <p14:creationId xmlns:p14="http://schemas.microsoft.com/office/powerpoint/2010/main" val="7292376"/>
+        <p14:creationId xmlns:p14="http://schemas.microsoft.com/office/powerpoint/2010/main" val="3620904430"/>
       </p:ext>
     </p:extLst>
   </p:cSld>
   <p:clrMapOvr>
     <a:masterClrMapping/>
   </p:clrMapOvr>
+  <p:timing>
+    <p:tnLst>
+      <p:par>
+        <p:cTn id="1" dur="indefinite" restart="never" nodeType="tmRoot"/>
+      </p:par>
+    </p:tnLst>
+  </p:timing>
 </p:sld>
 </file>
 
@@ -12635,13 +12093,13 @@
           <p:nvPr>
             <p:extLst>
               <p:ext uri="{D42A27DB-BD31-4B8C-83A1-F6EECF244321}">
-                <p14:modId xmlns:p14="http://schemas.microsoft.com/office/powerpoint/2010/main" val="1595136543"/>
+                <p14:modId xmlns:p14="http://schemas.microsoft.com/office/powerpoint/2010/main" val="3276770678"/>
               </p:ext>
             </p:extLst>
           </p:nvPr>
         </p:nvGraphicFramePr>
         <p:xfrm>
-          <a:off x="8851849" y="1713211"/>
+          <a:off x="8911116" y="2370543"/>
           <a:ext cx="2952330" cy="3707669"/>
         </p:xfrm>
         <a:graphic>
@@ -12654,14 +12112,14 @@
                 <a:gridCol w="289755">
                   <a:extLst>
                     <a:ext uri="{9D8B030D-6E8A-4147-A177-3AD203B41FA5}">
-                      <a16:colId xmlns="" xmlns:a16="http://schemas.microsoft.com/office/drawing/2014/main" val="20000"/>
+                      <a16:colId xmlns:a16="http://schemas.microsoft.com/office/drawing/2014/main" xmlns="" val="20000"/>
                     </a:ext>
                   </a:extLst>
                 </a:gridCol>
                 <a:gridCol w="2662575">
                   <a:extLst>
                     <a:ext uri="{9D8B030D-6E8A-4147-A177-3AD203B41FA5}">
-                      <a16:colId xmlns="" xmlns:a16="http://schemas.microsoft.com/office/drawing/2014/main" val="20001"/>
+                      <a16:colId xmlns:a16="http://schemas.microsoft.com/office/drawing/2014/main" xmlns="" val="20001"/>
                     </a:ext>
                   </a:extLst>
                 </a:gridCol>
@@ -12819,7 +12277,7 @@
                 </a:tc>
                 <a:extLst>
                   <a:ext uri="{0D108BD9-81ED-4DB2-BD59-A6C34878D82A}">
-                    <a16:rowId xmlns="" xmlns:a16="http://schemas.microsoft.com/office/drawing/2014/main" val="10000"/>
+                    <a16:rowId xmlns:a16="http://schemas.microsoft.com/office/drawing/2014/main" xmlns="" val="10000"/>
                   </a:ext>
                 </a:extLst>
               </a:tr>
@@ -13098,7 +12556,7 @@
                 </a:tc>
                 <a:extLst>
                   <a:ext uri="{0D108BD9-81ED-4DB2-BD59-A6C34878D82A}">
-                    <a16:rowId xmlns="" xmlns:a16="http://schemas.microsoft.com/office/drawing/2014/main" val="10001"/>
+                    <a16:rowId xmlns:a16="http://schemas.microsoft.com/office/drawing/2014/main" xmlns="" val="10001"/>
                   </a:ext>
                 </a:extLst>
               </a:tr>
@@ -13251,7 +12709,7 @@
                 </a:tc>
                 <a:extLst>
                   <a:ext uri="{0D108BD9-81ED-4DB2-BD59-A6C34878D82A}">
-                    <a16:rowId xmlns="" xmlns:a16="http://schemas.microsoft.com/office/drawing/2014/main" val="10002"/>
+                    <a16:rowId xmlns:a16="http://schemas.microsoft.com/office/drawing/2014/main" xmlns="" val="10002"/>
                   </a:ext>
                 </a:extLst>
               </a:tr>
@@ -14198,7 +13656,7 @@
         <p:spPr>
           <a:xfrm>
             <a:off x="4574242" y="5414682"/>
-            <a:ext cx="1010770" cy="304800"/>
+            <a:ext cx="515472" cy="304800"/>
           </a:xfrm>
           <a:prstGeom prst="rect">
             <a:avLst/>
@@ -14232,13 +13690,12 @@
             <a:pPr algn="ctr"/>
             <a:r>
               <a:rPr lang="ko-KR" altLang="en-US" sz="1100" dirty="0" smtClean="0"/>
-              <a:t>세미나 </a:t>
-            </a:r>
-            <a:r>
-              <a:rPr lang="ko-KR" altLang="en-US" sz="1100" dirty="0" smtClean="0"/>
-              <a:t>취소</a:t>
-            </a:r>
-            <a:endParaRPr lang="ko-KR" altLang="en-US" sz="1100" dirty="0"/>
+              <a:t>취</a:t>
+            </a:r>
+            <a:r>
+              <a:rPr lang="ko-KR" altLang="en-US" sz="1100" dirty="0"/>
+              <a:t>소</a:t>
+            </a:r>
           </a:p>
         </p:txBody>
       </p:sp>
@@ -14296,13 +13753,13 @@
           <p:nvPr>
             <p:extLst>
               <p:ext uri="{D42A27DB-BD31-4B8C-83A1-F6EECF244321}">
-                <p14:modId xmlns:p14="http://schemas.microsoft.com/office/powerpoint/2010/main" val="4042580311"/>
+                <p14:modId xmlns:p14="http://schemas.microsoft.com/office/powerpoint/2010/main" val="1608522552"/>
               </p:ext>
             </p:extLst>
           </p:nvPr>
         </p:nvGraphicFramePr>
         <p:xfrm>
-          <a:off x="1898479" y="205423"/>
+          <a:off x="1828800" y="1515035"/>
           <a:ext cx="6048672" cy="864096"/>
         </p:xfrm>
         <a:graphic>
@@ -14315,14 +13772,14 @@
                 <a:gridCol w="1152128">
                   <a:extLst>
                     <a:ext uri="{9D8B030D-6E8A-4147-A177-3AD203B41FA5}">
-                      <a16:colId xmlns:a16="http://schemas.microsoft.com/office/drawing/2014/main" xmlns="" val="20000"/>
+                      <a16:colId xmlns="" xmlns:a16="http://schemas.microsoft.com/office/drawing/2014/main" val="20000"/>
                     </a:ext>
                   </a:extLst>
                 </a:gridCol>
                 <a:gridCol w="4896544">
                   <a:extLst>
                     <a:ext uri="{9D8B030D-6E8A-4147-A177-3AD203B41FA5}">
-                      <a16:colId xmlns:a16="http://schemas.microsoft.com/office/drawing/2014/main" xmlns="" val="20001"/>
+                      <a16:colId xmlns="" xmlns:a16="http://schemas.microsoft.com/office/drawing/2014/main" val="20001"/>
                     </a:ext>
                   </a:extLst>
                 </a:gridCol>
@@ -14546,7 +14003,7 @@
                 </a:tc>
                 <a:extLst>
                   <a:ext uri="{0D108BD9-81ED-4DB2-BD59-A6C34878D82A}">
-                    <a16:rowId xmlns:a16="http://schemas.microsoft.com/office/drawing/2014/main" xmlns="" val="10000"/>
+                    <a16:rowId xmlns="" xmlns:a16="http://schemas.microsoft.com/office/drawing/2014/main" val="10000"/>
                   </a:ext>
                 </a:extLst>
               </a:tr>
@@ -14563,13 +14020,13 @@
           <p:nvPr>
             <p:extLst>
               <p:ext uri="{D42A27DB-BD31-4B8C-83A1-F6EECF244321}">
-                <p14:modId xmlns:p14="http://schemas.microsoft.com/office/powerpoint/2010/main" val="667733746"/>
+                <p14:modId xmlns:p14="http://schemas.microsoft.com/office/powerpoint/2010/main" val="460100123"/>
               </p:ext>
             </p:extLst>
           </p:nvPr>
         </p:nvGraphicFramePr>
         <p:xfrm>
-          <a:off x="9037226" y="736572"/>
+          <a:off x="9096493" y="1393904"/>
           <a:ext cx="2536708" cy="655340"/>
         </p:xfrm>
         <a:graphic>
@@ -14747,16 +14204,132 @@
           </a:graphicData>
         </a:graphic>
       </p:graphicFrame>
+      <p:sp>
+        <p:nvSpPr>
+          <p:cNvPr id="28" name="TextBox 27"/>
+          <p:cNvSpPr txBox="1"/>
+          <p:nvPr/>
+        </p:nvSpPr>
+        <p:spPr>
+          <a:xfrm>
+            <a:off x="380466" y="160866"/>
+            <a:ext cx="6455083" cy="584775"/>
+          </a:xfrm>
+          <a:prstGeom prst="rect">
+            <a:avLst/>
+          </a:prstGeom>
+          <a:noFill/>
+        </p:spPr>
+        <p:txBody>
+          <a:bodyPr wrap="square" rtlCol="0">
+            <a:spAutoFit/>
+          </a:bodyPr>
+          <a:lstStyle/>
+          <a:p>
+            <a:pPr lvl="0">
+              <a:buClr>
+                <a:srgbClr val="000000"/>
+              </a:buClr>
+              <a:buSzPts val="1500"/>
+              <a:defRPr/>
+            </a:pPr>
+            <a:r>
+              <a:rPr lang="ko-KR" altLang="en-US" sz="3200" dirty="0" err="1" smtClean="0">
+                <a:solidFill>
+                  <a:schemeClr val="bg1"/>
+                </a:solidFill>
+              </a:rPr>
+              <a:t>마이페이지</a:t>
+            </a:r>
+            <a:r>
+              <a:rPr lang="ko-KR" altLang="en-US" dirty="0" smtClean="0">
+                <a:solidFill>
+                  <a:schemeClr val="bg1"/>
+                </a:solidFill>
+              </a:rPr>
+              <a:t> </a:t>
+            </a:r>
+            <a:r>
+              <a:rPr lang="en-US" altLang="ko-KR" dirty="0" smtClean="0">
+                <a:solidFill>
+                  <a:schemeClr val="bg1"/>
+                </a:solidFill>
+              </a:rPr>
+              <a:t>– </a:t>
+            </a:r>
+            <a:r>
+              <a:rPr lang="ko-KR" altLang="en-US" dirty="0" smtClean="0">
+                <a:solidFill>
+                  <a:schemeClr val="bg1"/>
+                </a:solidFill>
+              </a:rPr>
+              <a:t>세미나 예약 리스트</a:t>
+            </a:r>
+            <a:r>
+              <a:rPr lang="en-US" altLang="ko-KR" dirty="0" smtClean="0">
+                <a:solidFill>
+                  <a:schemeClr val="bg1"/>
+                </a:solidFill>
+              </a:rPr>
+              <a:t>(</a:t>
+            </a:r>
+            <a:r>
+              <a:rPr lang="ko-KR" altLang="en-US" dirty="0" smtClean="0">
+                <a:solidFill>
+                  <a:schemeClr val="bg1"/>
+                </a:solidFill>
+              </a:rPr>
+              <a:t>조회</a:t>
+            </a:r>
+            <a:r>
+              <a:rPr lang="en-US" altLang="ko-KR" dirty="0" smtClean="0">
+                <a:solidFill>
+                  <a:schemeClr val="bg1"/>
+                </a:solidFill>
+              </a:rPr>
+              <a:t>-</a:t>
+            </a:r>
+            <a:r>
+              <a:rPr lang="ko-KR" altLang="en-US" dirty="0" smtClean="0">
+                <a:solidFill>
+                  <a:schemeClr val="bg1"/>
+                </a:solidFill>
+              </a:rPr>
+              <a:t>호스트</a:t>
+            </a:r>
+            <a:r>
+              <a:rPr lang="en-US" altLang="ko-KR" dirty="0" smtClean="0">
+                <a:solidFill>
+                  <a:schemeClr val="bg1"/>
+                </a:solidFill>
+              </a:rPr>
+              <a:t>)</a:t>
+            </a:r>
+            <a:endParaRPr lang="ko-KR" altLang="en-US" dirty="0">
+              <a:solidFill>
+                <a:schemeClr val="bg1"/>
+              </a:solidFill>
+            </a:endParaRPr>
+          </a:p>
+        </p:txBody>
+      </p:sp>
     </p:spTree>
     <p:extLst>
       <p:ext uri="{BB962C8B-B14F-4D97-AF65-F5344CB8AC3E}">
-        <p14:creationId xmlns:p14="http://schemas.microsoft.com/office/powerpoint/2010/main" val="2881566596"/>
+        <p14:creationId xmlns:p14="http://schemas.microsoft.com/office/powerpoint/2010/main" val="714601872"/>
       </p:ext>
     </p:extLst>
   </p:cSld>
   <p:clrMapOvr>
     <a:masterClrMapping/>
   </p:clrMapOvr>
+  <p:timing>
+    <p:tnLst>
+      <p:par>
+        <p:cTn id="1" dur="indefinite" restart="never" nodeType="tmRoot"/>
+      </p:par>
+    </p:tnLst>
+  </p:timing>
 </p:sld>
 </file>
 
@@ -14784,13 +14357,13 @@
           <p:nvPr>
             <p:extLst>
               <p:ext uri="{D42A27DB-BD31-4B8C-83A1-F6EECF244321}">
-                <p14:modId xmlns:p14="http://schemas.microsoft.com/office/powerpoint/2010/main" val="1905630818"/>
+                <p14:modId xmlns:p14="http://schemas.microsoft.com/office/powerpoint/2010/main" val="198324961"/>
               </p:ext>
             </p:extLst>
           </p:nvPr>
         </p:nvGraphicFramePr>
         <p:xfrm>
-          <a:off x="8834915" y="1699701"/>
+          <a:off x="8902648" y="2976283"/>
           <a:ext cx="2952330" cy="1824908"/>
         </p:xfrm>
         <a:graphic>
@@ -14803,14 +14376,14 @@
                 <a:gridCol w="289755">
                   <a:extLst>
                     <a:ext uri="{9D8B030D-6E8A-4147-A177-3AD203B41FA5}">
-                      <a16:colId xmlns="" xmlns:a16="http://schemas.microsoft.com/office/drawing/2014/main" val="20000"/>
+                      <a16:colId xmlns:a16="http://schemas.microsoft.com/office/drawing/2014/main" xmlns="" val="20000"/>
                     </a:ext>
                   </a:extLst>
                 </a:gridCol>
                 <a:gridCol w="2662575">
                   <a:extLst>
                     <a:ext uri="{9D8B030D-6E8A-4147-A177-3AD203B41FA5}">
-                      <a16:colId xmlns="" xmlns:a16="http://schemas.microsoft.com/office/drawing/2014/main" val="20001"/>
+                      <a16:colId xmlns:a16="http://schemas.microsoft.com/office/drawing/2014/main" xmlns="" val="20001"/>
                     </a:ext>
                   </a:extLst>
                 </a:gridCol>
@@ -14968,7 +14541,7 @@
                 </a:tc>
                 <a:extLst>
                   <a:ext uri="{0D108BD9-81ED-4DB2-BD59-A6C34878D82A}">
-                    <a16:rowId xmlns="" xmlns:a16="http://schemas.microsoft.com/office/drawing/2014/main" val="10000"/>
+                    <a16:rowId xmlns:a16="http://schemas.microsoft.com/office/drawing/2014/main" xmlns="" val="10000"/>
                   </a:ext>
                 </a:extLst>
               </a:tr>
@@ -15150,7 +14723,7 @@
                 </a:tc>
                 <a:extLst>
                   <a:ext uri="{0D108BD9-81ED-4DB2-BD59-A6C34878D82A}">
-                    <a16:rowId xmlns="" xmlns:a16="http://schemas.microsoft.com/office/drawing/2014/main" val="10001"/>
+                    <a16:rowId xmlns:a16="http://schemas.microsoft.com/office/drawing/2014/main" xmlns="" val="10001"/>
                   </a:ext>
                 </a:extLst>
               </a:tr>
@@ -15303,7 +14876,7 @@
                 </a:tc>
                 <a:extLst>
                   <a:ext uri="{0D108BD9-81ED-4DB2-BD59-A6C34878D82A}">
-                    <a16:rowId xmlns="" xmlns:a16="http://schemas.microsoft.com/office/drawing/2014/main" val="10002"/>
+                    <a16:rowId xmlns:a16="http://schemas.microsoft.com/office/drawing/2014/main" xmlns="" val="10002"/>
                   </a:ext>
                 </a:extLst>
               </a:tr>
@@ -16041,8 +15614,8 @@
         </p:nvSpPr>
         <p:spPr>
           <a:xfrm>
-            <a:off x="3928781" y="5414682"/>
-            <a:ext cx="904475" cy="304800"/>
+            <a:off x="3928782" y="5414682"/>
+            <a:ext cx="515472" cy="304800"/>
           </a:xfrm>
           <a:prstGeom prst="rect">
             <a:avLst/>
@@ -16076,7 +15649,7 @@
             <a:pPr algn="ctr"/>
             <a:r>
               <a:rPr lang="ko-KR" altLang="en-US" sz="1100" dirty="0" smtClean="0"/>
-              <a:t>예약 취소</a:t>
+              <a:t>취소</a:t>
             </a:r>
             <a:endParaRPr lang="ko-KR" altLang="en-US" sz="1100" dirty="0"/>
           </a:p>
@@ -16131,271 +15704,6 @@
       </p:sp>
       <p:graphicFrame>
         <p:nvGraphicFramePr>
-          <p:cNvPr id="25" name="Google Shape;165;g7c553259d1_0_81"/>
-          <p:cNvGraphicFramePr/>
-          <p:nvPr>
-            <p:extLst>
-              <p:ext uri="{D42A27DB-BD31-4B8C-83A1-F6EECF244321}">
-                <p14:modId xmlns:p14="http://schemas.microsoft.com/office/powerpoint/2010/main" val="884201918"/>
-              </p:ext>
-            </p:extLst>
-          </p:nvPr>
-        </p:nvGraphicFramePr>
-        <p:xfrm>
-          <a:off x="1898479" y="205423"/>
-          <a:ext cx="6048672" cy="864096"/>
-        </p:xfrm>
-        <a:graphic>
-          <a:graphicData uri="http://schemas.openxmlformats.org/drawingml/2006/table">
-            <a:tbl>
-              <a:tblPr firstRow="1" bandRow="1">
-                <a:noFill/>
-              </a:tblPr>
-              <a:tblGrid>
-                <a:gridCol w="1152128">
-                  <a:extLst>
-                    <a:ext uri="{9D8B030D-6E8A-4147-A177-3AD203B41FA5}">
-                      <a16:colId xmlns:a16="http://schemas.microsoft.com/office/drawing/2014/main" xmlns="" val="20000"/>
-                    </a:ext>
-                  </a:extLst>
-                </a:gridCol>
-                <a:gridCol w="4896544">
-                  <a:extLst>
-                    <a:ext uri="{9D8B030D-6E8A-4147-A177-3AD203B41FA5}">
-                      <a16:colId xmlns:a16="http://schemas.microsoft.com/office/drawing/2014/main" xmlns="" val="20001"/>
-                    </a:ext>
-                  </a:extLst>
-                </a:gridCol>
-              </a:tblGrid>
-              <a:tr h="864096">
-                <a:tc>
-                  <a:txBody>
-                    <a:bodyPr/>
-                    <a:lstStyle/>
-                    <a:p>
-                      <a:pPr marL="0" marR="0" lvl="0" indent="0" algn="ctr" rtl="0">
-                        <a:lnSpc>
-                          <a:spcPct val="100000"/>
-                        </a:lnSpc>
-                        <a:spcBef>
-                          <a:spcPts val="0"/>
-                        </a:spcBef>
-                        <a:spcAft>
-                          <a:spcPts val="0"/>
-                        </a:spcAft>
-                        <a:buClr>
-                          <a:srgbClr val="000000"/>
-                        </a:buClr>
-                        <a:buSzPts val="1500"/>
-                        <a:buFont typeface="Arial"/>
-                        <a:buNone/>
-                      </a:pPr>
-                      <a:r>
-                        <a:rPr lang="ko-KR" altLang="en-US" sz="1500" b="0" u="none" strike="noStrike" cap="none" dirty="0" err="1" smtClean="0">
-                          <a:solidFill>
-                            <a:schemeClr val="dk1"/>
-                          </a:solidFill>
-                        </a:rPr>
-                        <a:t>화면명</a:t>
-                      </a:r>
-                      <a:endParaRPr sz="1500" b="0" u="none" strike="noStrike" cap="none" dirty="0">
-                        <a:solidFill>
-                          <a:schemeClr val="dk1"/>
-                        </a:solidFill>
-                      </a:endParaRPr>
-                    </a:p>
-                  </a:txBody>
-                  <a:tcPr marL="74304" marR="74304" marT="45725" marB="45725" anchor="ctr">
-                    <a:lnL w="12700" cap="flat" cmpd="sng">
-                      <a:solidFill>
-                        <a:schemeClr val="dk1"/>
-                      </a:solidFill>
-                      <a:prstDash val="solid"/>
-                      <a:round/>
-                      <a:headEnd type="none" w="sm" len="sm"/>
-                      <a:tailEnd type="none" w="sm" len="sm"/>
-                    </a:lnL>
-                    <a:lnR w="12700" cap="flat" cmpd="sng">
-                      <a:solidFill>
-                        <a:schemeClr val="dk1"/>
-                      </a:solidFill>
-                      <a:prstDash val="solid"/>
-                      <a:round/>
-                      <a:headEnd type="none" w="sm" len="sm"/>
-                      <a:tailEnd type="none" w="sm" len="sm"/>
-                    </a:lnR>
-                    <a:lnT w="12700" cap="flat" cmpd="sng">
-                      <a:solidFill>
-                        <a:schemeClr val="dk1"/>
-                      </a:solidFill>
-                      <a:prstDash val="solid"/>
-                      <a:round/>
-                      <a:headEnd type="none" w="sm" len="sm"/>
-                      <a:tailEnd type="none" w="sm" len="sm"/>
-                    </a:lnT>
-                    <a:lnB w="12700" cap="flat" cmpd="sng">
-                      <a:solidFill>
-                        <a:schemeClr val="dk1"/>
-                      </a:solidFill>
-                      <a:prstDash val="solid"/>
-                      <a:round/>
-                      <a:headEnd type="none" w="sm" len="sm"/>
-                      <a:tailEnd type="none" w="sm" len="sm"/>
-                    </a:lnB>
-                    <a:solidFill>
-                      <a:srgbClr val="D8D8D8"/>
-                    </a:solidFill>
-                  </a:tcPr>
-                </a:tc>
-                <a:tc>
-                  <a:txBody>
-                    <a:bodyPr/>
-                    <a:lstStyle/>
-                    <a:p>
-                      <a:pPr marL="0" marR="0" lvl="0" indent="0" algn="ctr" defTabSz="914400" rtl="0" eaLnBrk="1" fontAlgn="auto" latinLnBrk="1" hangingPunct="1">
-                        <a:lnSpc>
-                          <a:spcPct val="100000"/>
-                        </a:lnSpc>
-                        <a:spcBef>
-                          <a:spcPts val="0"/>
-                        </a:spcBef>
-                        <a:spcAft>
-                          <a:spcPts val="0"/>
-                        </a:spcAft>
-                        <a:buClr>
-                          <a:srgbClr val="000000"/>
-                        </a:buClr>
-                        <a:buSzPts val="1500"/>
-                        <a:buFont typeface="Arial"/>
-                        <a:buNone/>
-                        <a:tabLst/>
-                        <a:defRPr/>
-                      </a:pPr>
-                      <a:r>
-                        <a:rPr lang="ko-KR" altLang="en-US" sz="2800" b="0" u="none" strike="noStrike" cap="none" baseline="0" dirty="0" err="1" smtClean="0">
-                          <a:solidFill>
-                            <a:schemeClr val="dk1"/>
-                          </a:solidFill>
-                        </a:rPr>
-                        <a:t>마이페이지</a:t>
-                      </a:r>
-                      <a:r>
-                        <a:rPr lang="en-US" altLang="ko-KR" sz="1500" b="0" u="none" strike="noStrike" cap="none" baseline="0" dirty="0" smtClean="0">
-                          <a:solidFill>
-                            <a:schemeClr val="dk1"/>
-                          </a:solidFill>
-                        </a:rPr>
-                        <a:t>– </a:t>
-                      </a:r>
-                      <a:r>
-                        <a:rPr lang="ko-KR" altLang="en-US" sz="1500" b="0" u="none" strike="noStrike" cap="none" baseline="0" dirty="0" smtClean="0">
-                          <a:solidFill>
-                            <a:schemeClr val="dk1"/>
-                          </a:solidFill>
-                        </a:rPr>
-                        <a:t>세미나 예약 리스트</a:t>
-                      </a:r>
-                      <a:r>
-                        <a:rPr lang="en-US" altLang="ko-KR" sz="1500" b="0" u="none" strike="noStrike" cap="none" baseline="0" dirty="0" smtClean="0">
-                          <a:solidFill>
-                            <a:schemeClr val="dk1"/>
-                          </a:solidFill>
-                        </a:rPr>
-                        <a:t>(</a:t>
-                      </a:r>
-                      <a:r>
-                        <a:rPr lang="ko-KR" altLang="en-US" sz="1500" b="0" u="none" strike="noStrike" cap="none" baseline="0" dirty="0" smtClean="0">
-                          <a:solidFill>
-                            <a:schemeClr val="dk1"/>
-                          </a:solidFill>
-                        </a:rPr>
-                        <a:t>조회</a:t>
-                      </a:r>
-                      <a:r>
-                        <a:rPr lang="en-US" altLang="ko-KR" sz="1500" b="0" u="none" strike="noStrike" cap="none" baseline="0" dirty="0" smtClean="0">
-                          <a:solidFill>
-                            <a:schemeClr val="dk1"/>
-                          </a:solidFill>
-                        </a:rPr>
-                        <a:t>-</a:t>
-                      </a:r>
-                      <a:r>
-                        <a:rPr lang="ko-KR" altLang="en-US" sz="1500" b="0" u="none" strike="noStrike" cap="none" baseline="0" dirty="0" smtClean="0">
-                          <a:solidFill>
-                            <a:schemeClr val="dk1"/>
-                          </a:solidFill>
-                        </a:rPr>
-                        <a:t>게스트</a:t>
-                      </a:r>
-                      <a:r>
-                        <a:rPr lang="en-US" altLang="ko-KR" sz="1500" b="0" u="none" strike="noStrike" cap="none" baseline="0" dirty="0" smtClean="0">
-                          <a:solidFill>
-                            <a:schemeClr val="dk1"/>
-                          </a:solidFill>
-                        </a:rPr>
-                        <a:t>)</a:t>
-                      </a:r>
-                      <a:endParaRPr lang="ko-KR" altLang="en-US" sz="1500" b="0" u="none" strike="noStrike" cap="none" dirty="0" smtClean="0">
-                        <a:solidFill>
-                          <a:schemeClr val="dk1"/>
-                        </a:solidFill>
-                      </a:endParaRPr>
-                    </a:p>
-                  </a:txBody>
-                  <a:tcPr marL="74304" marR="74304" marT="45725" marB="45725" anchor="ctr">
-                    <a:lnL w="12700" cap="flat" cmpd="sng">
-                      <a:solidFill>
-                        <a:schemeClr val="dk1"/>
-                      </a:solidFill>
-                      <a:prstDash val="solid"/>
-                      <a:round/>
-                      <a:headEnd type="none" w="sm" len="sm"/>
-                      <a:tailEnd type="none" w="sm" len="sm"/>
-                    </a:lnL>
-                    <a:lnR w="12700" cap="flat" cmpd="sng">
-                      <a:solidFill>
-                        <a:schemeClr val="dk1"/>
-                      </a:solidFill>
-                      <a:prstDash val="solid"/>
-                      <a:round/>
-                      <a:headEnd type="none" w="sm" len="sm"/>
-                      <a:tailEnd type="none" w="sm" len="sm"/>
-                    </a:lnR>
-                    <a:lnT w="12700" cap="flat" cmpd="sng">
-                      <a:solidFill>
-                        <a:schemeClr val="dk1"/>
-                      </a:solidFill>
-                      <a:prstDash val="solid"/>
-                      <a:round/>
-                      <a:headEnd type="none" w="sm" len="sm"/>
-                      <a:tailEnd type="none" w="sm" len="sm"/>
-                    </a:lnT>
-                    <a:lnB w="12700" cap="flat" cmpd="sng">
-                      <a:solidFill>
-                        <a:schemeClr val="dk1"/>
-                      </a:solidFill>
-                      <a:prstDash val="solid"/>
-                      <a:round/>
-                      <a:headEnd type="none" w="sm" len="sm"/>
-                      <a:tailEnd type="none" w="sm" len="sm"/>
-                    </a:lnB>
-                    <a:solidFill>
-                      <a:schemeClr val="lt1"/>
-                    </a:solidFill>
-                  </a:tcPr>
-                </a:tc>
-                <a:extLst>
-                  <a:ext uri="{0D108BD9-81ED-4DB2-BD59-A6C34878D82A}">
-                    <a16:rowId xmlns:a16="http://schemas.microsoft.com/office/drawing/2014/main" xmlns="" val="10000"/>
-                  </a:ext>
-                </a:extLst>
-              </a:tr>
-            </a:tbl>
-          </a:graphicData>
-        </a:graphic>
-      </p:graphicFrame>
-      <p:graphicFrame>
-        <p:nvGraphicFramePr>
           <p:cNvPr id="26" name="표 25"/>
           <p:cNvGraphicFramePr>
             <a:graphicFrameLocks noGrp="1"/>
@@ -16403,13 +15711,13 @@
           <p:nvPr>
             <p:extLst>
               <p:ext uri="{D42A27DB-BD31-4B8C-83A1-F6EECF244321}">
-                <p14:modId xmlns:p14="http://schemas.microsoft.com/office/powerpoint/2010/main" val="1385695018"/>
+                <p14:modId xmlns:p14="http://schemas.microsoft.com/office/powerpoint/2010/main" val="695970602"/>
               </p:ext>
             </p:extLst>
           </p:nvPr>
         </p:nvGraphicFramePr>
         <p:xfrm>
-          <a:off x="9037226" y="736572"/>
+          <a:off x="9104959" y="2013154"/>
           <a:ext cx="2536708" cy="655340"/>
         </p:xfrm>
         <a:graphic>
@@ -16587,16 +15895,132 @@
           </a:graphicData>
         </a:graphic>
       </p:graphicFrame>
+      <p:sp>
+        <p:nvSpPr>
+          <p:cNvPr id="27" name="TextBox 26"/>
+          <p:cNvSpPr txBox="1"/>
+          <p:nvPr/>
+        </p:nvSpPr>
+        <p:spPr>
+          <a:xfrm>
+            <a:off x="380466" y="160866"/>
+            <a:ext cx="6455083" cy="584775"/>
+          </a:xfrm>
+          <a:prstGeom prst="rect">
+            <a:avLst/>
+          </a:prstGeom>
+          <a:noFill/>
+        </p:spPr>
+        <p:txBody>
+          <a:bodyPr wrap="square" rtlCol="0">
+            <a:spAutoFit/>
+          </a:bodyPr>
+          <a:lstStyle/>
+          <a:p>
+            <a:pPr lvl="0">
+              <a:buClr>
+                <a:srgbClr val="000000"/>
+              </a:buClr>
+              <a:buSzPts val="1500"/>
+              <a:defRPr/>
+            </a:pPr>
+            <a:r>
+              <a:rPr lang="ko-KR" altLang="en-US" sz="3200" dirty="0" err="1" smtClean="0">
+                <a:solidFill>
+                  <a:schemeClr val="bg1"/>
+                </a:solidFill>
+              </a:rPr>
+              <a:t>마이페이지</a:t>
+            </a:r>
+            <a:r>
+              <a:rPr lang="ko-KR" altLang="en-US" dirty="0" smtClean="0">
+                <a:solidFill>
+                  <a:schemeClr val="bg1"/>
+                </a:solidFill>
+              </a:rPr>
+              <a:t> </a:t>
+            </a:r>
+            <a:r>
+              <a:rPr lang="en-US" altLang="ko-KR" dirty="0" smtClean="0">
+                <a:solidFill>
+                  <a:schemeClr val="bg1"/>
+                </a:solidFill>
+              </a:rPr>
+              <a:t>– </a:t>
+            </a:r>
+            <a:r>
+              <a:rPr lang="ko-KR" altLang="en-US" dirty="0" smtClean="0">
+                <a:solidFill>
+                  <a:schemeClr val="bg1"/>
+                </a:solidFill>
+              </a:rPr>
+              <a:t>세미나 예약 리스트</a:t>
+            </a:r>
+            <a:r>
+              <a:rPr lang="en-US" altLang="ko-KR" dirty="0" smtClean="0">
+                <a:solidFill>
+                  <a:schemeClr val="bg1"/>
+                </a:solidFill>
+              </a:rPr>
+              <a:t>(</a:t>
+            </a:r>
+            <a:r>
+              <a:rPr lang="ko-KR" altLang="en-US" dirty="0" smtClean="0">
+                <a:solidFill>
+                  <a:schemeClr val="bg1"/>
+                </a:solidFill>
+              </a:rPr>
+              <a:t>조회</a:t>
+            </a:r>
+            <a:r>
+              <a:rPr lang="en-US" altLang="ko-KR" dirty="0" smtClean="0">
+                <a:solidFill>
+                  <a:schemeClr val="bg1"/>
+                </a:solidFill>
+              </a:rPr>
+              <a:t>-</a:t>
+            </a:r>
+            <a:r>
+              <a:rPr lang="ko-KR" altLang="en-US" dirty="0" smtClean="0">
+                <a:solidFill>
+                  <a:schemeClr val="bg1"/>
+                </a:solidFill>
+              </a:rPr>
+              <a:t>게스트</a:t>
+            </a:r>
+            <a:r>
+              <a:rPr lang="en-US" altLang="ko-KR" dirty="0" smtClean="0">
+                <a:solidFill>
+                  <a:schemeClr val="bg1"/>
+                </a:solidFill>
+              </a:rPr>
+              <a:t>)</a:t>
+            </a:r>
+            <a:endParaRPr lang="ko-KR" altLang="en-US" dirty="0">
+              <a:solidFill>
+                <a:schemeClr val="bg1"/>
+              </a:solidFill>
+            </a:endParaRPr>
+          </a:p>
+        </p:txBody>
+      </p:sp>
     </p:spTree>
     <p:extLst>
       <p:ext uri="{BB962C8B-B14F-4D97-AF65-F5344CB8AC3E}">
-        <p14:creationId xmlns:p14="http://schemas.microsoft.com/office/powerpoint/2010/main" val="1421400386"/>
+        <p14:creationId xmlns:p14="http://schemas.microsoft.com/office/powerpoint/2010/main" val="4133457597"/>
       </p:ext>
     </p:extLst>
   </p:cSld>
   <p:clrMapOvr>
     <a:masterClrMapping/>
   </p:clrMapOvr>
+  <p:timing>
+    <p:tnLst>
+      <p:par>
+        <p:cTn id="1" dur="indefinite" restart="never" nodeType="tmRoot"/>
+      </p:par>
+    </p:tnLst>
+  </p:timing>
 </p:sld>
 </file>
 
@@ -16624,13 +16048,13 @@
           <p:nvPr>
             <p:extLst>
               <p:ext uri="{D42A27DB-BD31-4B8C-83A1-F6EECF244321}">
-                <p14:modId xmlns:p14="http://schemas.microsoft.com/office/powerpoint/2010/main" val="3166585305"/>
+                <p14:modId xmlns:p14="http://schemas.microsoft.com/office/powerpoint/2010/main" val="3064790366"/>
               </p:ext>
             </p:extLst>
           </p:nvPr>
         </p:nvGraphicFramePr>
         <p:xfrm>
-          <a:off x="8817982" y="1969986"/>
+          <a:off x="8809515" y="3206119"/>
           <a:ext cx="2952330" cy="1626788"/>
         </p:xfrm>
         <a:graphic>
@@ -16643,14 +16067,14 @@
                 <a:gridCol w="289755">
                   <a:extLst>
                     <a:ext uri="{9D8B030D-6E8A-4147-A177-3AD203B41FA5}">
-                      <a16:colId xmlns="" xmlns:a16="http://schemas.microsoft.com/office/drawing/2014/main" val="20000"/>
+                      <a16:colId xmlns:a16="http://schemas.microsoft.com/office/drawing/2014/main" xmlns="" val="20000"/>
                     </a:ext>
                   </a:extLst>
                 </a:gridCol>
                 <a:gridCol w="2662575">
                   <a:extLst>
                     <a:ext uri="{9D8B030D-6E8A-4147-A177-3AD203B41FA5}">
-                      <a16:colId xmlns="" xmlns:a16="http://schemas.microsoft.com/office/drawing/2014/main" val="20001"/>
+                      <a16:colId xmlns:a16="http://schemas.microsoft.com/office/drawing/2014/main" xmlns="" val="20001"/>
                     </a:ext>
                   </a:extLst>
                 </a:gridCol>
@@ -16808,7 +16232,7 @@
                 </a:tc>
                 <a:extLst>
                   <a:ext uri="{0D108BD9-81ED-4DB2-BD59-A6C34878D82A}">
-                    <a16:rowId xmlns="" xmlns:a16="http://schemas.microsoft.com/office/drawing/2014/main" val="10000"/>
+                    <a16:rowId xmlns:a16="http://schemas.microsoft.com/office/drawing/2014/main" xmlns="" val="10000"/>
                   </a:ext>
                 </a:extLst>
               </a:tr>
@@ -16978,7 +16402,7 @@
                 </a:tc>
                 <a:extLst>
                   <a:ext uri="{0D108BD9-81ED-4DB2-BD59-A6C34878D82A}">
-                    <a16:rowId xmlns="" xmlns:a16="http://schemas.microsoft.com/office/drawing/2014/main" val="10001"/>
+                    <a16:rowId xmlns:a16="http://schemas.microsoft.com/office/drawing/2014/main" xmlns="" val="10001"/>
                   </a:ext>
                 </a:extLst>
               </a:tr>
@@ -17147,7 +16571,7 @@
                 </a:tc>
                 <a:extLst>
                   <a:ext uri="{0D108BD9-81ED-4DB2-BD59-A6C34878D82A}">
-                    <a16:rowId xmlns="" xmlns:a16="http://schemas.microsoft.com/office/drawing/2014/main" val="10002"/>
+                    <a16:rowId xmlns:a16="http://schemas.microsoft.com/office/drawing/2014/main" xmlns="" val="10002"/>
                   </a:ext>
                 </a:extLst>
               </a:tr>
@@ -17431,239 +16855,6 @@
       </p:sp>
       <p:graphicFrame>
         <p:nvGraphicFramePr>
-          <p:cNvPr id="18" name="Google Shape;165;g7c553259d1_0_81"/>
-          <p:cNvGraphicFramePr/>
-          <p:nvPr>
-            <p:extLst>
-              <p:ext uri="{D42A27DB-BD31-4B8C-83A1-F6EECF244321}">
-                <p14:modId xmlns:p14="http://schemas.microsoft.com/office/powerpoint/2010/main" val="3565496351"/>
-              </p:ext>
-            </p:extLst>
-          </p:nvPr>
-        </p:nvGraphicFramePr>
-        <p:xfrm>
-          <a:off x="1898479" y="205423"/>
-          <a:ext cx="6048672" cy="864096"/>
-        </p:xfrm>
-        <a:graphic>
-          <a:graphicData uri="http://schemas.openxmlformats.org/drawingml/2006/table">
-            <a:tbl>
-              <a:tblPr firstRow="1" bandRow="1">
-                <a:noFill/>
-              </a:tblPr>
-              <a:tblGrid>
-                <a:gridCol w="1152128">
-                  <a:extLst>
-                    <a:ext uri="{9D8B030D-6E8A-4147-A177-3AD203B41FA5}">
-                      <a16:colId xmlns:a16="http://schemas.microsoft.com/office/drawing/2014/main" xmlns="" val="20000"/>
-                    </a:ext>
-                  </a:extLst>
-                </a:gridCol>
-                <a:gridCol w="4896544">
-                  <a:extLst>
-                    <a:ext uri="{9D8B030D-6E8A-4147-A177-3AD203B41FA5}">
-                      <a16:colId xmlns:a16="http://schemas.microsoft.com/office/drawing/2014/main" xmlns="" val="20001"/>
-                    </a:ext>
-                  </a:extLst>
-                </a:gridCol>
-              </a:tblGrid>
-              <a:tr h="864096">
-                <a:tc>
-                  <a:txBody>
-                    <a:bodyPr/>
-                    <a:lstStyle/>
-                    <a:p>
-                      <a:pPr marL="0" marR="0" lvl="0" indent="0" algn="ctr" rtl="0">
-                        <a:lnSpc>
-                          <a:spcPct val="100000"/>
-                        </a:lnSpc>
-                        <a:spcBef>
-                          <a:spcPts val="0"/>
-                        </a:spcBef>
-                        <a:spcAft>
-                          <a:spcPts val="0"/>
-                        </a:spcAft>
-                        <a:buClr>
-                          <a:srgbClr val="000000"/>
-                        </a:buClr>
-                        <a:buSzPts val="1500"/>
-                        <a:buFont typeface="Arial"/>
-                        <a:buNone/>
-                      </a:pPr>
-                      <a:r>
-                        <a:rPr lang="ko-KR" altLang="en-US" sz="1500" b="0" u="none" strike="noStrike" cap="none" dirty="0" err="1" smtClean="0">
-                          <a:solidFill>
-                            <a:schemeClr val="dk1"/>
-                          </a:solidFill>
-                        </a:rPr>
-                        <a:t>화면명</a:t>
-                      </a:r>
-                      <a:endParaRPr sz="1500" b="0" u="none" strike="noStrike" cap="none" dirty="0">
-                        <a:solidFill>
-                          <a:schemeClr val="dk1"/>
-                        </a:solidFill>
-                      </a:endParaRPr>
-                    </a:p>
-                  </a:txBody>
-                  <a:tcPr marL="74304" marR="74304" marT="45725" marB="45725" anchor="ctr">
-                    <a:lnL w="12700" cap="flat" cmpd="sng">
-                      <a:solidFill>
-                        <a:schemeClr val="dk1"/>
-                      </a:solidFill>
-                      <a:prstDash val="solid"/>
-                      <a:round/>
-                      <a:headEnd type="none" w="sm" len="sm"/>
-                      <a:tailEnd type="none" w="sm" len="sm"/>
-                    </a:lnL>
-                    <a:lnR w="12700" cap="flat" cmpd="sng">
-                      <a:solidFill>
-                        <a:schemeClr val="dk1"/>
-                      </a:solidFill>
-                      <a:prstDash val="solid"/>
-                      <a:round/>
-                      <a:headEnd type="none" w="sm" len="sm"/>
-                      <a:tailEnd type="none" w="sm" len="sm"/>
-                    </a:lnR>
-                    <a:lnT w="12700" cap="flat" cmpd="sng">
-                      <a:solidFill>
-                        <a:schemeClr val="dk1"/>
-                      </a:solidFill>
-                      <a:prstDash val="solid"/>
-                      <a:round/>
-                      <a:headEnd type="none" w="sm" len="sm"/>
-                      <a:tailEnd type="none" w="sm" len="sm"/>
-                    </a:lnT>
-                    <a:lnB w="12700" cap="flat" cmpd="sng">
-                      <a:solidFill>
-                        <a:schemeClr val="dk1"/>
-                      </a:solidFill>
-                      <a:prstDash val="solid"/>
-                      <a:round/>
-                      <a:headEnd type="none" w="sm" len="sm"/>
-                      <a:tailEnd type="none" w="sm" len="sm"/>
-                    </a:lnB>
-                    <a:solidFill>
-                      <a:srgbClr val="D8D8D8"/>
-                    </a:solidFill>
-                  </a:tcPr>
-                </a:tc>
-                <a:tc>
-                  <a:txBody>
-                    <a:bodyPr/>
-                    <a:lstStyle/>
-                    <a:p>
-                      <a:pPr marL="0" marR="0" lvl="0" indent="0" algn="ctr" defTabSz="914400" rtl="0" eaLnBrk="1" fontAlgn="auto" latinLnBrk="1" hangingPunct="1">
-                        <a:lnSpc>
-                          <a:spcPct val="100000"/>
-                        </a:lnSpc>
-                        <a:spcBef>
-                          <a:spcPts val="0"/>
-                        </a:spcBef>
-                        <a:spcAft>
-                          <a:spcPts val="0"/>
-                        </a:spcAft>
-                        <a:buClr>
-                          <a:srgbClr val="000000"/>
-                        </a:buClr>
-                        <a:buSzPts val="1500"/>
-                        <a:buFont typeface="Arial"/>
-                        <a:buNone/>
-                        <a:tabLst/>
-                        <a:defRPr/>
-                      </a:pPr>
-                      <a:r>
-                        <a:rPr lang="ko-KR" altLang="en-US" sz="2800" b="0" u="none" strike="noStrike" cap="none" baseline="0" dirty="0" err="1" smtClean="0">
-                          <a:solidFill>
-                            <a:schemeClr val="dk1"/>
-                          </a:solidFill>
-                        </a:rPr>
-                        <a:t>마이페이지</a:t>
-                      </a:r>
-                      <a:r>
-                        <a:rPr lang="en-US" altLang="ko-KR" sz="1500" b="0" u="none" strike="noStrike" cap="none" baseline="0" dirty="0" smtClean="0">
-                          <a:solidFill>
-                            <a:schemeClr val="dk1"/>
-                          </a:solidFill>
-                        </a:rPr>
-                        <a:t>– </a:t>
-                      </a:r>
-                      <a:r>
-                        <a:rPr lang="ko-KR" altLang="en-US" sz="1500" b="0" u="none" strike="noStrike" cap="none" baseline="0" dirty="0" err="1" smtClean="0">
-                          <a:solidFill>
-                            <a:schemeClr val="dk1"/>
-                          </a:solidFill>
-                        </a:rPr>
-                        <a:t>밋업</a:t>
-                      </a:r>
-                      <a:r>
-                        <a:rPr lang="ko-KR" altLang="en-US" sz="1500" b="0" u="none" strike="noStrike" cap="none" baseline="0" dirty="0" smtClean="0">
-                          <a:solidFill>
-                            <a:schemeClr val="dk1"/>
-                          </a:solidFill>
-                        </a:rPr>
-                        <a:t> 예약 리스트</a:t>
-                      </a:r>
-                      <a:endParaRPr lang="ko-KR" altLang="en-US" sz="1500" b="0" u="none" strike="noStrike" cap="none" dirty="0" smtClean="0">
-                        <a:solidFill>
-                          <a:schemeClr val="dk1"/>
-                        </a:solidFill>
-                      </a:endParaRPr>
-                    </a:p>
-                  </a:txBody>
-                  <a:tcPr marL="74304" marR="74304" marT="45725" marB="45725" anchor="ctr">
-                    <a:lnL w="12700" cap="flat" cmpd="sng">
-                      <a:solidFill>
-                        <a:schemeClr val="dk1"/>
-                      </a:solidFill>
-                      <a:prstDash val="solid"/>
-                      <a:round/>
-                      <a:headEnd type="none" w="sm" len="sm"/>
-                      <a:tailEnd type="none" w="sm" len="sm"/>
-                    </a:lnL>
-                    <a:lnR w="12700" cap="flat" cmpd="sng">
-                      <a:solidFill>
-                        <a:schemeClr val="dk1"/>
-                      </a:solidFill>
-                      <a:prstDash val="solid"/>
-                      <a:round/>
-                      <a:headEnd type="none" w="sm" len="sm"/>
-                      <a:tailEnd type="none" w="sm" len="sm"/>
-                    </a:lnR>
-                    <a:lnT w="12700" cap="flat" cmpd="sng">
-                      <a:solidFill>
-                        <a:schemeClr val="dk1"/>
-                      </a:solidFill>
-                      <a:prstDash val="solid"/>
-                      <a:round/>
-                      <a:headEnd type="none" w="sm" len="sm"/>
-                      <a:tailEnd type="none" w="sm" len="sm"/>
-                    </a:lnT>
-                    <a:lnB w="12700" cap="flat" cmpd="sng">
-                      <a:solidFill>
-                        <a:schemeClr val="dk1"/>
-                      </a:solidFill>
-                      <a:prstDash val="solid"/>
-                      <a:round/>
-                      <a:headEnd type="none" w="sm" len="sm"/>
-                      <a:tailEnd type="none" w="sm" len="sm"/>
-                    </a:lnB>
-                    <a:solidFill>
-                      <a:schemeClr val="lt1"/>
-                    </a:solidFill>
-                  </a:tcPr>
-                </a:tc>
-                <a:extLst>
-                  <a:ext uri="{0D108BD9-81ED-4DB2-BD59-A6C34878D82A}">
-                    <a16:rowId xmlns:a16="http://schemas.microsoft.com/office/drawing/2014/main" xmlns="" val="10000"/>
-                  </a:ext>
-                </a:extLst>
-              </a:tr>
-            </a:tbl>
-          </a:graphicData>
-        </a:graphic>
-      </p:graphicFrame>
-      <p:graphicFrame>
-        <p:nvGraphicFramePr>
           <p:cNvPr id="19" name="표 18"/>
           <p:cNvGraphicFramePr>
             <a:graphicFrameLocks noGrp="1"/>
@@ -17671,13 +16862,13 @@
           <p:nvPr>
             <p:extLst>
               <p:ext uri="{D42A27DB-BD31-4B8C-83A1-F6EECF244321}">
-                <p14:modId xmlns:p14="http://schemas.microsoft.com/office/powerpoint/2010/main" val="2405102319"/>
+                <p14:modId xmlns:p14="http://schemas.microsoft.com/office/powerpoint/2010/main" val="3161816836"/>
               </p:ext>
             </p:extLst>
           </p:nvPr>
         </p:nvGraphicFramePr>
         <p:xfrm>
-          <a:off x="9037225" y="736572"/>
+          <a:off x="9028758" y="1972705"/>
           <a:ext cx="2739907" cy="655340"/>
         </p:xfrm>
         <a:graphic>
@@ -17855,16 +17046,100 @@
           </a:graphicData>
         </a:graphic>
       </p:graphicFrame>
+      <p:sp>
+        <p:nvSpPr>
+          <p:cNvPr id="10" name="TextBox 9"/>
+          <p:cNvSpPr txBox="1"/>
+          <p:nvPr/>
+        </p:nvSpPr>
+        <p:spPr>
+          <a:xfrm>
+            <a:off x="380466" y="160866"/>
+            <a:ext cx="6455083" cy="584775"/>
+          </a:xfrm>
+          <a:prstGeom prst="rect">
+            <a:avLst/>
+          </a:prstGeom>
+          <a:noFill/>
+        </p:spPr>
+        <p:txBody>
+          <a:bodyPr wrap="square" rtlCol="0">
+            <a:spAutoFit/>
+          </a:bodyPr>
+          <a:lstStyle/>
+          <a:p>
+            <a:pPr lvl="0">
+              <a:buClr>
+                <a:srgbClr val="000000"/>
+              </a:buClr>
+              <a:buSzPts val="1500"/>
+              <a:defRPr/>
+            </a:pPr>
+            <a:r>
+              <a:rPr lang="ko-KR" altLang="en-US" sz="3200" dirty="0" err="1" smtClean="0">
+                <a:solidFill>
+                  <a:schemeClr val="bg1"/>
+                </a:solidFill>
+              </a:rPr>
+              <a:t>마이페이지</a:t>
+            </a:r>
+            <a:r>
+              <a:rPr lang="ko-KR" altLang="en-US" dirty="0" smtClean="0">
+                <a:solidFill>
+                  <a:schemeClr val="bg1"/>
+                </a:solidFill>
+              </a:rPr>
+              <a:t> </a:t>
+            </a:r>
+            <a:r>
+              <a:rPr lang="en-US" altLang="ko-KR" dirty="0" smtClean="0">
+                <a:solidFill>
+                  <a:schemeClr val="bg1"/>
+                </a:solidFill>
+              </a:rPr>
+              <a:t>– </a:t>
+            </a:r>
+            <a:r>
+              <a:rPr lang="ko-KR" altLang="en-US" dirty="0" err="1" smtClean="0">
+                <a:solidFill>
+                  <a:schemeClr val="bg1"/>
+                </a:solidFill>
+              </a:rPr>
+              <a:t>밋업</a:t>
+            </a:r>
+            <a:r>
+              <a:rPr lang="ko-KR" altLang="en-US" dirty="0" smtClean="0">
+                <a:solidFill>
+                  <a:schemeClr val="bg1"/>
+                </a:solidFill>
+              </a:rPr>
+              <a:t> 예약 리스트</a:t>
+            </a:r>
+            <a:endParaRPr lang="ko-KR" altLang="en-US" dirty="0">
+              <a:solidFill>
+                <a:schemeClr val="bg1"/>
+              </a:solidFill>
+            </a:endParaRPr>
+          </a:p>
+        </p:txBody>
+      </p:sp>
     </p:spTree>
     <p:extLst>
       <p:ext uri="{BB962C8B-B14F-4D97-AF65-F5344CB8AC3E}">
-        <p14:creationId xmlns:p14="http://schemas.microsoft.com/office/powerpoint/2010/main" val="3027702752"/>
+        <p14:creationId xmlns:p14="http://schemas.microsoft.com/office/powerpoint/2010/main" val="4079930598"/>
       </p:ext>
     </p:extLst>
   </p:cSld>
   <p:clrMapOvr>
     <a:masterClrMapping/>
   </p:clrMapOvr>
+  <p:timing>
+    <p:tnLst>
+      <p:par>
+        <p:cTn id="1" dur="indefinite" restart="never" nodeType="tmRoot"/>
+      </p:par>
+    </p:tnLst>
+  </p:timing>
 </p:sld>
 </file>
 
@@ -17892,13 +17167,13 @@
           <p:nvPr>
             <p:extLst>
               <p:ext uri="{D42A27DB-BD31-4B8C-83A1-F6EECF244321}">
-                <p14:modId xmlns:p14="http://schemas.microsoft.com/office/powerpoint/2010/main" val="3761838027"/>
+                <p14:modId xmlns:p14="http://schemas.microsoft.com/office/powerpoint/2010/main" val="957361358"/>
               </p:ext>
             </p:extLst>
           </p:nvPr>
         </p:nvGraphicFramePr>
         <p:xfrm>
-          <a:off x="8843382" y="1752366"/>
+          <a:off x="8894182" y="2988166"/>
           <a:ext cx="2952330" cy="1824908"/>
         </p:xfrm>
         <a:graphic>
@@ -17911,14 +17186,14 @@
                 <a:gridCol w="289755">
                   <a:extLst>
                     <a:ext uri="{9D8B030D-6E8A-4147-A177-3AD203B41FA5}">
-                      <a16:colId xmlns="" xmlns:a16="http://schemas.microsoft.com/office/drawing/2014/main" val="20000"/>
+                      <a16:colId xmlns:a16="http://schemas.microsoft.com/office/drawing/2014/main" xmlns="" val="20000"/>
                     </a:ext>
                   </a:extLst>
                 </a:gridCol>
                 <a:gridCol w="2662575">
                   <a:extLst>
                     <a:ext uri="{9D8B030D-6E8A-4147-A177-3AD203B41FA5}">
-                      <a16:colId xmlns="" xmlns:a16="http://schemas.microsoft.com/office/drawing/2014/main" val="20001"/>
+                      <a16:colId xmlns:a16="http://schemas.microsoft.com/office/drawing/2014/main" xmlns="" val="20001"/>
                     </a:ext>
                   </a:extLst>
                 </a:gridCol>
@@ -18076,7 +17351,7 @@
                 </a:tc>
                 <a:extLst>
                   <a:ext uri="{0D108BD9-81ED-4DB2-BD59-A6C34878D82A}">
-                    <a16:rowId xmlns="" xmlns:a16="http://schemas.microsoft.com/office/drawing/2014/main" val="10000"/>
+                    <a16:rowId xmlns:a16="http://schemas.microsoft.com/office/drawing/2014/main" xmlns="" val="10000"/>
                   </a:ext>
                 </a:extLst>
               </a:tr>
@@ -18258,7 +17533,7 @@
                 </a:tc>
                 <a:extLst>
                   <a:ext uri="{0D108BD9-81ED-4DB2-BD59-A6C34878D82A}">
-                    <a16:rowId xmlns="" xmlns:a16="http://schemas.microsoft.com/office/drawing/2014/main" val="10001"/>
+                    <a16:rowId xmlns:a16="http://schemas.microsoft.com/office/drawing/2014/main" xmlns="" val="10001"/>
                   </a:ext>
                 </a:extLst>
               </a:tr>
@@ -18411,7 +17686,7 @@
                 </a:tc>
                 <a:extLst>
                   <a:ext uri="{0D108BD9-81ED-4DB2-BD59-A6C34878D82A}">
-                    <a16:rowId xmlns="" xmlns:a16="http://schemas.microsoft.com/office/drawing/2014/main" val="10002"/>
+                    <a16:rowId xmlns:a16="http://schemas.microsoft.com/office/drawing/2014/main" xmlns="" val="10002"/>
                   </a:ext>
                 </a:extLst>
               </a:tr>
@@ -18972,8 +18247,8 @@
         </p:nvSpPr>
         <p:spPr>
           <a:xfrm>
-            <a:off x="3928781" y="5414682"/>
-            <a:ext cx="969789" cy="304800"/>
+            <a:off x="3928782" y="5414682"/>
+            <a:ext cx="515472" cy="304800"/>
           </a:xfrm>
           <a:prstGeom prst="rect">
             <a:avLst/>
@@ -19007,7 +18282,7 @@
             <a:pPr algn="ctr"/>
             <a:r>
               <a:rPr lang="ko-KR" altLang="en-US" sz="1100" dirty="0" smtClean="0"/>
-              <a:t>예약 취소</a:t>
+              <a:t>취소</a:t>
             </a:r>
             <a:endParaRPr lang="ko-KR" altLang="en-US" sz="1100" dirty="0"/>
           </a:p>
@@ -19062,263 +18337,6 @@
       </p:sp>
       <p:graphicFrame>
         <p:nvGraphicFramePr>
-          <p:cNvPr id="25" name="Google Shape;165;g7c553259d1_0_81"/>
-          <p:cNvGraphicFramePr/>
-          <p:nvPr>
-            <p:extLst>
-              <p:ext uri="{D42A27DB-BD31-4B8C-83A1-F6EECF244321}">
-                <p14:modId xmlns:p14="http://schemas.microsoft.com/office/powerpoint/2010/main" val="1595013312"/>
-              </p:ext>
-            </p:extLst>
-          </p:nvPr>
-        </p:nvGraphicFramePr>
-        <p:xfrm>
-          <a:off x="1898479" y="205423"/>
-          <a:ext cx="6048672" cy="864096"/>
-        </p:xfrm>
-        <a:graphic>
-          <a:graphicData uri="http://schemas.openxmlformats.org/drawingml/2006/table">
-            <a:tbl>
-              <a:tblPr firstRow="1" bandRow="1">
-                <a:noFill/>
-              </a:tblPr>
-              <a:tblGrid>
-                <a:gridCol w="1152128">
-                  <a:extLst>
-                    <a:ext uri="{9D8B030D-6E8A-4147-A177-3AD203B41FA5}">
-                      <a16:colId xmlns:a16="http://schemas.microsoft.com/office/drawing/2014/main" xmlns="" val="20000"/>
-                    </a:ext>
-                  </a:extLst>
-                </a:gridCol>
-                <a:gridCol w="4896544">
-                  <a:extLst>
-                    <a:ext uri="{9D8B030D-6E8A-4147-A177-3AD203B41FA5}">
-                      <a16:colId xmlns:a16="http://schemas.microsoft.com/office/drawing/2014/main" xmlns="" val="20001"/>
-                    </a:ext>
-                  </a:extLst>
-                </a:gridCol>
-              </a:tblGrid>
-              <a:tr h="864096">
-                <a:tc>
-                  <a:txBody>
-                    <a:bodyPr/>
-                    <a:lstStyle/>
-                    <a:p>
-                      <a:pPr marL="0" marR="0" lvl="0" indent="0" algn="ctr" rtl="0">
-                        <a:lnSpc>
-                          <a:spcPct val="100000"/>
-                        </a:lnSpc>
-                        <a:spcBef>
-                          <a:spcPts val="0"/>
-                        </a:spcBef>
-                        <a:spcAft>
-                          <a:spcPts val="0"/>
-                        </a:spcAft>
-                        <a:buClr>
-                          <a:srgbClr val="000000"/>
-                        </a:buClr>
-                        <a:buSzPts val="1500"/>
-                        <a:buFont typeface="Arial"/>
-                        <a:buNone/>
-                      </a:pPr>
-                      <a:r>
-                        <a:rPr lang="ko-KR" altLang="en-US" sz="1500" b="0" u="none" strike="noStrike" cap="none" dirty="0" err="1" smtClean="0">
-                          <a:solidFill>
-                            <a:schemeClr val="dk1"/>
-                          </a:solidFill>
-                        </a:rPr>
-                        <a:t>화면명</a:t>
-                      </a:r>
-                      <a:endParaRPr sz="1500" b="0" u="none" strike="noStrike" cap="none" dirty="0">
-                        <a:solidFill>
-                          <a:schemeClr val="dk1"/>
-                        </a:solidFill>
-                      </a:endParaRPr>
-                    </a:p>
-                  </a:txBody>
-                  <a:tcPr marL="74304" marR="74304" marT="45725" marB="45725" anchor="ctr">
-                    <a:lnL w="12700" cap="flat" cmpd="sng">
-                      <a:solidFill>
-                        <a:schemeClr val="dk1"/>
-                      </a:solidFill>
-                      <a:prstDash val="solid"/>
-                      <a:round/>
-                      <a:headEnd type="none" w="sm" len="sm"/>
-                      <a:tailEnd type="none" w="sm" len="sm"/>
-                    </a:lnL>
-                    <a:lnR w="12700" cap="flat" cmpd="sng">
-                      <a:solidFill>
-                        <a:schemeClr val="dk1"/>
-                      </a:solidFill>
-                      <a:prstDash val="solid"/>
-                      <a:round/>
-                      <a:headEnd type="none" w="sm" len="sm"/>
-                      <a:tailEnd type="none" w="sm" len="sm"/>
-                    </a:lnR>
-                    <a:lnT w="12700" cap="flat" cmpd="sng">
-                      <a:solidFill>
-                        <a:schemeClr val="dk1"/>
-                      </a:solidFill>
-                      <a:prstDash val="solid"/>
-                      <a:round/>
-                      <a:headEnd type="none" w="sm" len="sm"/>
-                      <a:tailEnd type="none" w="sm" len="sm"/>
-                    </a:lnT>
-                    <a:lnB w="12700" cap="flat" cmpd="sng">
-                      <a:solidFill>
-                        <a:schemeClr val="dk1"/>
-                      </a:solidFill>
-                      <a:prstDash val="solid"/>
-                      <a:round/>
-                      <a:headEnd type="none" w="sm" len="sm"/>
-                      <a:tailEnd type="none" w="sm" len="sm"/>
-                    </a:lnB>
-                    <a:solidFill>
-                      <a:srgbClr val="D8D8D8"/>
-                    </a:solidFill>
-                  </a:tcPr>
-                </a:tc>
-                <a:tc>
-                  <a:txBody>
-                    <a:bodyPr/>
-                    <a:lstStyle/>
-                    <a:p>
-                      <a:pPr marL="0" marR="0" lvl="0" indent="0" algn="ctr" defTabSz="914400" rtl="0" eaLnBrk="1" fontAlgn="auto" latinLnBrk="1" hangingPunct="1">
-                        <a:lnSpc>
-                          <a:spcPct val="100000"/>
-                        </a:lnSpc>
-                        <a:spcBef>
-                          <a:spcPts val="0"/>
-                        </a:spcBef>
-                        <a:spcAft>
-                          <a:spcPts val="0"/>
-                        </a:spcAft>
-                        <a:buClr>
-                          <a:srgbClr val="000000"/>
-                        </a:buClr>
-                        <a:buSzPts val="1500"/>
-                        <a:buFont typeface="Arial"/>
-                        <a:buNone/>
-                        <a:tabLst/>
-                        <a:defRPr/>
-                      </a:pPr>
-                      <a:r>
-                        <a:rPr lang="ko-KR" altLang="en-US" sz="2800" b="0" u="none" strike="noStrike" cap="none" baseline="0" dirty="0" err="1" smtClean="0">
-                          <a:solidFill>
-                            <a:schemeClr val="dk1"/>
-                          </a:solidFill>
-                        </a:rPr>
-                        <a:t>마이페이지</a:t>
-                      </a:r>
-                      <a:r>
-                        <a:rPr lang="en-US" altLang="ko-KR" sz="1500" b="0" u="none" strike="noStrike" cap="none" baseline="0" dirty="0" smtClean="0">
-                          <a:solidFill>
-                            <a:schemeClr val="dk1"/>
-                          </a:solidFill>
-                        </a:rPr>
-                        <a:t>– </a:t>
-                      </a:r>
-                      <a:r>
-                        <a:rPr lang="ko-KR" altLang="en-US" sz="1500" b="0" u="none" strike="noStrike" cap="none" baseline="0" dirty="0" err="1" smtClean="0">
-                          <a:solidFill>
-                            <a:schemeClr val="dk1"/>
-                          </a:solidFill>
-                        </a:rPr>
-                        <a:t>밋업</a:t>
-                      </a:r>
-                      <a:r>
-                        <a:rPr lang="ko-KR" altLang="en-US" sz="1500" b="0" u="none" strike="noStrike" cap="none" baseline="0" dirty="0" smtClean="0">
-                          <a:solidFill>
-                            <a:schemeClr val="dk1"/>
-                          </a:solidFill>
-                        </a:rPr>
-                        <a:t> 예약 리스트</a:t>
-                      </a:r>
-                      <a:r>
-                        <a:rPr lang="en-US" altLang="ko-KR" sz="1500" b="0" u="none" strike="noStrike" cap="none" baseline="0" dirty="0" smtClean="0">
-                          <a:solidFill>
-                            <a:schemeClr val="dk1"/>
-                          </a:solidFill>
-                        </a:rPr>
-                        <a:t>(</a:t>
-                      </a:r>
-                      <a:r>
-                        <a:rPr lang="ko-KR" altLang="en-US" sz="1500" b="0" u="none" strike="noStrike" cap="none" baseline="0" dirty="0" smtClean="0">
-                          <a:solidFill>
-                            <a:schemeClr val="dk1"/>
-                          </a:solidFill>
-                        </a:rPr>
-                        <a:t>조회</a:t>
-                      </a:r>
-                      <a:r>
-                        <a:rPr lang="en-US" altLang="ko-KR" sz="1500" b="0" u="none" strike="noStrike" cap="none" baseline="0" dirty="0" smtClean="0">
-                          <a:solidFill>
-                            <a:schemeClr val="dk1"/>
-                          </a:solidFill>
-                        </a:rPr>
-                        <a:t>)</a:t>
-                      </a:r>
-                      <a:endParaRPr lang="ko-KR" altLang="en-US" sz="1500" b="0" u="none" strike="noStrike" cap="none" dirty="0" smtClean="0">
-                        <a:solidFill>
-                          <a:schemeClr val="dk1"/>
-                        </a:solidFill>
-                      </a:endParaRPr>
-                    </a:p>
-                  </a:txBody>
-                  <a:tcPr marL="74304" marR="74304" marT="45725" marB="45725" anchor="ctr">
-                    <a:lnL w="12700" cap="flat" cmpd="sng">
-                      <a:solidFill>
-                        <a:schemeClr val="dk1"/>
-                      </a:solidFill>
-                      <a:prstDash val="solid"/>
-                      <a:round/>
-                      <a:headEnd type="none" w="sm" len="sm"/>
-                      <a:tailEnd type="none" w="sm" len="sm"/>
-                    </a:lnL>
-                    <a:lnR w="12700" cap="flat" cmpd="sng">
-                      <a:solidFill>
-                        <a:schemeClr val="dk1"/>
-                      </a:solidFill>
-                      <a:prstDash val="solid"/>
-                      <a:round/>
-                      <a:headEnd type="none" w="sm" len="sm"/>
-                      <a:tailEnd type="none" w="sm" len="sm"/>
-                    </a:lnR>
-                    <a:lnT w="12700" cap="flat" cmpd="sng">
-                      <a:solidFill>
-                        <a:schemeClr val="dk1"/>
-                      </a:solidFill>
-                      <a:prstDash val="solid"/>
-                      <a:round/>
-                      <a:headEnd type="none" w="sm" len="sm"/>
-                      <a:tailEnd type="none" w="sm" len="sm"/>
-                    </a:lnT>
-                    <a:lnB w="12700" cap="flat" cmpd="sng">
-                      <a:solidFill>
-                        <a:schemeClr val="dk1"/>
-                      </a:solidFill>
-                      <a:prstDash val="solid"/>
-                      <a:round/>
-                      <a:headEnd type="none" w="sm" len="sm"/>
-                      <a:tailEnd type="none" w="sm" len="sm"/>
-                    </a:lnB>
-                    <a:solidFill>
-                      <a:schemeClr val="lt1"/>
-                    </a:solidFill>
-                  </a:tcPr>
-                </a:tc>
-                <a:extLst>
-                  <a:ext uri="{0D108BD9-81ED-4DB2-BD59-A6C34878D82A}">
-                    <a16:rowId xmlns:a16="http://schemas.microsoft.com/office/drawing/2014/main" xmlns="" val="10000"/>
-                  </a:ext>
-                </a:extLst>
-              </a:tr>
-            </a:tbl>
-          </a:graphicData>
-        </a:graphic>
-      </p:graphicFrame>
-      <p:graphicFrame>
-        <p:nvGraphicFramePr>
           <p:cNvPr id="26" name="표 25"/>
           <p:cNvGraphicFramePr>
             <a:graphicFrameLocks noGrp="1"/>
@@ -19326,13 +18344,13 @@
           <p:nvPr>
             <p:extLst>
               <p:ext uri="{D42A27DB-BD31-4B8C-83A1-F6EECF244321}">
-                <p14:modId xmlns:p14="http://schemas.microsoft.com/office/powerpoint/2010/main" val="560806669"/>
+                <p14:modId xmlns:p14="http://schemas.microsoft.com/office/powerpoint/2010/main" val="2856413243"/>
               </p:ext>
             </p:extLst>
           </p:nvPr>
         </p:nvGraphicFramePr>
         <p:xfrm>
-          <a:off x="9037225" y="736572"/>
+          <a:off x="9088025" y="1972372"/>
           <a:ext cx="2739907" cy="655340"/>
         </p:xfrm>
         <a:graphic>
@@ -19510,16 +18528,124 @@
           </a:graphicData>
         </a:graphic>
       </p:graphicFrame>
+      <p:sp>
+        <p:nvSpPr>
+          <p:cNvPr id="20" name="TextBox 19"/>
+          <p:cNvSpPr txBox="1"/>
+          <p:nvPr/>
+        </p:nvSpPr>
+        <p:spPr>
+          <a:xfrm>
+            <a:off x="380466" y="160866"/>
+            <a:ext cx="6455083" cy="584775"/>
+          </a:xfrm>
+          <a:prstGeom prst="rect">
+            <a:avLst/>
+          </a:prstGeom>
+          <a:noFill/>
+        </p:spPr>
+        <p:txBody>
+          <a:bodyPr wrap="square" rtlCol="0">
+            <a:spAutoFit/>
+          </a:bodyPr>
+          <a:lstStyle/>
+          <a:p>
+            <a:pPr lvl="0">
+              <a:buClr>
+                <a:srgbClr val="000000"/>
+              </a:buClr>
+              <a:buSzPts val="1500"/>
+              <a:defRPr/>
+            </a:pPr>
+            <a:r>
+              <a:rPr lang="ko-KR" altLang="en-US" sz="3200" dirty="0" err="1" smtClean="0">
+                <a:solidFill>
+                  <a:schemeClr val="bg1"/>
+                </a:solidFill>
+              </a:rPr>
+              <a:t>마이페이지</a:t>
+            </a:r>
+            <a:r>
+              <a:rPr lang="ko-KR" altLang="en-US" dirty="0" smtClean="0">
+                <a:solidFill>
+                  <a:schemeClr val="bg1"/>
+                </a:solidFill>
+              </a:rPr>
+              <a:t> </a:t>
+            </a:r>
+            <a:r>
+              <a:rPr lang="en-US" altLang="ko-KR" dirty="0" smtClean="0">
+                <a:solidFill>
+                  <a:schemeClr val="bg1"/>
+                </a:solidFill>
+              </a:rPr>
+              <a:t>– </a:t>
+            </a:r>
+            <a:r>
+              <a:rPr lang="ko-KR" altLang="en-US" dirty="0" err="1" smtClean="0">
+                <a:solidFill>
+                  <a:schemeClr val="bg1"/>
+                </a:solidFill>
+              </a:rPr>
+              <a:t>밋업</a:t>
+            </a:r>
+            <a:r>
+              <a:rPr lang="ko-KR" altLang="en-US" dirty="0" smtClean="0">
+                <a:solidFill>
+                  <a:schemeClr val="bg1"/>
+                </a:solidFill>
+              </a:rPr>
+              <a:t> 예약 리스트</a:t>
+            </a:r>
+            <a:r>
+              <a:rPr lang="en-US" altLang="ko-KR" dirty="0" smtClean="0">
+                <a:solidFill>
+                  <a:schemeClr val="bg1"/>
+                </a:solidFill>
+              </a:rPr>
+              <a:t>(</a:t>
+            </a:r>
+            <a:r>
+              <a:rPr lang="ko-KR" altLang="en-US" dirty="0" smtClean="0">
+                <a:solidFill>
+                  <a:schemeClr val="bg1"/>
+                </a:solidFill>
+              </a:rPr>
+              <a:t>조회</a:t>
+            </a:r>
+            <a:r>
+              <a:rPr lang="en-US" altLang="ko-KR" dirty="0" smtClean="0">
+                <a:solidFill>
+                  <a:schemeClr val="bg1"/>
+                </a:solidFill>
+              </a:rPr>
+              <a:t>)</a:t>
+            </a:r>
+            <a:endParaRPr lang="ko-KR" altLang="en-US" dirty="0">
+              <a:solidFill>
+                <a:schemeClr val="bg1"/>
+              </a:solidFill>
+            </a:endParaRPr>
+          </a:p>
+        </p:txBody>
+      </p:sp>
     </p:spTree>
     <p:extLst>
       <p:ext uri="{BB962C8B-B14F-4D97-AF65-F5344CB8AC3E}">
-        <p14:creationId xmlns:p14="http://schemas.microsoft.com/office/powerpoint/2010/main" val="114228019"/>
+        <p14:creationId xmlns:p14="http://schemas.microsoft.com/office/powerpoint/2010/main" val="3146648115"/>
       </p:ext>
     </p:extLst>
   </p:cSld>
   <p:clrMapOvr>
     <a:masterClrMapping/>
   </p:clrMapOvr>
+  <p:timing>
+    <p:tnLst>
+      <p:par>
+        <p:cTn id="1" dur="indefinite" restart="never" nodeType="tmRoot"/>
+      </p:par>
+    </p:tnLst>
+  </p:timing>
 </p:sld>
 </file>
 
@@ -19778,7 +18904,7 @@
   <a:extraClrSchemeLst/>
   <a:extLst>
     <a:ext uri="{05A4C25C-085E-4340-85A3-A5531E510DB2}">
-      <thm15:themeFamily xmlns="" xmlns:thm15="http://schemas.microsoft.com/office/thememl/2012/main" name="Office Theme" id="{62F939B6-93AF-4DB8-9C6B-D6C7DFDC589F}" vid="{4A3C46E8-61CC-4603-A589-7422A47A8E4A}"/>
+      <thm15:themeFamily xmlns:thm15="http://schemas.microsoft.com/office/thememl/2012/main" xmlns="" name="Office Theme" id="{62F939B6-93AF-4DB8-9C6B-D6C7DFDC589F}" vid="{4A3C46E8-61CC-4603-A589-7422A47A8E4A}"/>
     </a:ext>
   </a:extLst>
 </a:theme>
@@ -20039,7 +19165,7 @@
   <a:extraClrSchemeLst/>
   <a:extLst>
     <a:ext uri="{05A4C25C-085E-4340-85A3-A5531E510DB2}">
-      <thm15:themeFamily xmlns="" xmlns:thm15="http://schemas.microsoft.com/office/thememl/2012/main" name="Office Theme" id="{62F939B6-93AF-4DB8-9C6B-D6C7DFDC589F}" vid="{4A3C46E8-61CC-4603-A589-7422A47A8E4A}"/>
+      <thm15:themeFamily xmlns:thm15="http://schemas.microsoft.com/office/thememl/2012/main" xmlns="" name="Office Theme" id="{62F939B6-93AF-4DB8-9C6B-D6C7DFDC589F}" vid="{4A3C46E8-61CC-4603-A589-7422A47A8E4A}"/>
     </a:ext>
   </a:extLst>
 </a:theme>

</xml_diff>